<commit_message>
feat(Animal): add new abstract class
</commit_message>
<xml_diff>
--- a/week-07/lightning-talk/Lightning Talk (SW Dev Laws) Arnold BARNA 2017-10-15.pptx
+++ b/week-07/lightning-talk/Lightning Talk (SW Dev Laws) Arnold BARNA 2017-10-15.pptx
@@ -209,7 +209,7 @@
           <a:p>
             <a:fld id="{6A2461C8-3853-49D3-8BEE-8D9ED78F07D0}" type="datetimeFigureOut">
               <a:rPr lang="en-GB" smtClean="0"/>
-              <a:t>09/10/2017</a:t>
+              <a:t>16/10/2017</a:t>
             </a:fld>
             <a:endParaRPr lang="en-GB"/>
           </a:p>
@@ -703,7 +703,7 @@
           <a:p>
             <a:fld id="{45171105-4C99-459E-8C3A-C785AF6579B0}" type="datetime1">
               <a:rPr lang="en-GB" smtClean="0"/>
-              <a:t>09/10/2017</a:t>
+              <a:t>16/10/2017</a:t>
             </a:fld>
             <a:endParaRPr lang="en-GB"/>
           </a:p>
@@ -915,7 +915,7 @@
           <a:p>
             <a:fld id="{C75520F9-BAAA-4E2E-81F0-1963441CCABD}" type="datetime1">
               <a:rPr lang="en-GB" smtClean="0"/>
-              <a:t>09/10/2017</a:t>
+              <a:t>16/10/2017</a:t>
             </a:fld>
             <a:endParaRPr lang="en-GB"/>
           </a:p>
@@ -1175,7 +1175,7 @@
           <a:p>
             <a:fld id="{33DE7CFA-9DFE-400F-AB35-60654FC99333}" type="datetime1">
               <a:rPr lang="en-GB" smtClean="0"/>
-              <a:t>09/10/2017</a:t>
+              <a:t>16/10/2017</a:t>
             </a:fld>
             <a:endParaRPr lang="en-GB"/>
           </a:p>
@@ -1353,7 +1353,7 @@
           <a:p>
             <a:fld id="{C06A285D-1025-45A2-B3DA-E96E594BB942}" type="datetime1">
               <a:rPr lang="en-GB" smtClean="0"/>
-              <a:t>09/10/2017</a:t>
+              <a:t>16/10/2017</a:t>
             </a:fld>
             <a:endParaRPr lang="en-GB"/>
           </a:p>
@@ -1700,7 +1700,7 @@
           <a:p>
             <a:fld id="{558DF81A-CB98-433B-A0F3-1F8B4E63EB76}" type="datetime1">
               <a:rPr lang="en-GB" smtClean="0"/>
-              <a:t>09/10/2017</a:t>
+              <a:t>16/10/2017</a:t>
             </a:fld>
             <a:endParaRPr lang="en-GB"/>
           </a:p>
@@ -1979,7 +1979,7 @@
           <a:p>
             <a:fld id="{F43A802C-8080-491F-BF46-770DD8664778}" type="datetime1">
               <a:rPr lang="en-GB" smtClean="0"/>
-              <a:t>09/10/2017</a:t>
+              <a:t>16/10/2017</a:t>
             </a:fld>
             <a:endParaRPr lang="en-GB"/>
           </a:p>
@@ -2362,7 +2362,7 @@
           <a:p>
             <a:fld id="{1182AF20-C644-4B82-A093-D7BDF05ACAFE}" type="datetime1">
               <a:rPr lang="en-GB" smtClean="0"/>
-              <a:t>09/10/2017</a:t>
+              <a:t>16/10/2017</a:t>
             </a:fld>
             <a:endParaRPr lang="en-GB"/>
           </a:p>
@@ -2484,7 +2484,7 @@
           <a:p>
             <a:fld id="{8AEEF0D0-CDE7-4870-83F0-D17DA9453BFB}" type="datetime1">
               <a:rPr lang="en-GB" smtClean="0"/>
-              <a:t>09/10/2017</a:t>
+              <a:t>16/10/2017</a:t>
             </a:fld>
             <a:endParaRPr lang="en-GB"/>
           </a:p>
@@ -2659,7 +2659,7 @@
           <a:p>
             <a:fld id="{95E515B6-867E-455D-861E-637EF3FAE21F}" type="datetime1">
               <a:rPr lang="en-GB" smtClean="0"/>
-              <a:t>09/10/2017</a:t>
+              <a:t>16/10/2017</a:t>
             </a:fld>
             <a:endParaRPr lang="en-GB"/>
           </a:p>
@@ -3017,7 +3017,7 @@
           <a:p>
             <a:fld id="{BA601066-CDD8-4BBD-A491-94A18DB7B6DA}" type="datetime1">
               <a:rPr lang="en-GB" smtClean="0"/>
-              <a:t>09/10/2017</a:t>
+              <a:t>16/10/2017</a:t>
             </a:fld>
             <a:endParaRPr lang="en-GB"/>
           </a:p>
@@ -3403,7 +3403,7 @@
           <a:p>
             <a:fld id="{4EAC112E-DF81-4BA2-838F-13778EF28FFD}" type="datetime1">
               <a:rPr lang="en-GB" smtClean="0"/>
-              <a:t>09/10/2017</a:t>
+              <a:t>16/10/2017</a:t>
             </a:fld>
             <a:endParaRPr lang="en-GB"/>
           </a:p>
@@ -3694,7 +3694,7 @@
           <a:p>
             <a:fld id="{FC6EC7CC-945F-466C-9243-B570A10D2678}" type="datetime1">
               <a:rPr lang="en-GB" smtClean="0"/>
-              <a:t>09/10/2017</a:t>
+              <a:t>16/10/2017</a:t>
             </a:fld>
             <a:endParaRPr lang="en-GB"/>
           </a:p>
@@ -4685,42 +4685,6 @@
           </a:p>
         </p:txBody>
       </p:sp>
-      <p:pic>
-        <p:nvPicPr>
-          <p:cNvPr id="7" name="Kép 6">
-            <a:extLst>
-              <a:ext uri="{FF2B5EF4-FFF2-40B4-BE49-F238E27FC236}">
-                <a16:creationId xmlns:a16="http://schemas.microsoft.com/office/drawing/2014/main" id="{698C5EE2-8911-42A3-BC87-CE958F64ECE2}"/>
-              </a:ext>
-            </a:extLst>
-          </p:cNvPr>
-          <p:cNvPicPr>
-            <a:picLocks noChangeAspect="1"/>
-          </p:cNvPicPr>
-          <p:nvPr/>
-        </p:nvPicPr>
-        <p:blipFill>
-          <a:blip r:embed="rId2">
-            <a:extLst>
-              <a:ext uri="{28A0092B-C50C-407E-A947-70E740481C1C}">
-                <a14:useLocalDpi xmlns:a14="http://schemas.microsoft.com/office/drawing/2010/main" val="0"/>
-              </a:ext>
-            </a:extLst>
-          </a:blip>
-          <a:stretch>
-            <a:fillRect/>
-          </a:stretch>
-        </p:blipFill>
-        <p:spPr>
-          <a:xfrm>
-            <a:off x="7645746" y="1887165"/>
-            <a:ext cx="3509934" cy="3852153"/>
-          </a:xfrm>
-          <a:prstGeom prst="rect">
-            <a:avLst/>
-          </a:prstGeom>
-        </p:spPr>
-      </p:pic>
     </p:spTree>
     <p:extLst>
       <p:ext uri="{BB962C8B-B14F-4D97-AF65-F5344CB8AC3E}">
@@ -4882,6 +4846,42 @@
           </a:p>
         </p:txBody>
       </p:sp>
+      <p:pic>
+        <p:nvPicPr>
+          <p:cNvPr id="6" name="Kép 5">
+            <a:extLst>
+              <a:ext uri="{FF2B5EF4-FFF2-40B4-BE49-F238E27FC236}">
+                <a16:creationId xmlns:a16="http://schemas.microsoft.com/office/drawing/2014/main" id="{AB934350-656B-44BF-80FF-598F14F8174D}"/>
+              </a:ext>
+            </a:extLst>
+          </p:cNvPr>
+          <p:cNvPicPr>
+            <a:picLocks noChangeAspect="1"/>
+          </p:cNvPicPr>
+          <p:nvPr/>
+        </p:nvPicPr>
+        <p:blipFill>
+          <a:blip r:embed="rId2">
+            <a:extLst>
+              <a:ext uri="{28A0092B-C50C-407E-A947-70E740481C1C}">
+                <a14:useLocalDpi xmlns:a14="http://schemas.microsoft.com/office/drawing/2010/main" val="0"/>
+              </a:ext>
+            </a:extLst>
+          </a:blip>
+          <a:stretch>
+            <a:fillRect/>
+          </a:stretch>
+        </p:blipFill>
+        <p:spPr>
+          <a:xfrm>
+            <a:off x="7529208" y="2440038"/>
+            <a:ext cx="3677271" cy="3429055"/>
+          </a:xfrm>
+          <a:prstGeom prst="rect">
+            <a:avLst/>
+          </a:prstGeom>
+        </p:spPr>
+      </p:pic>
     </p:spTree>
     <p:extLst>
       <p:ext uri="{BB962C8B-B14F-4D97-AF65-F5344CB8AC3E}">
@@ -4999,10 +4999,53 @@
               <a:rPr lang="en-US" i="1" dirty="0"/>
               <a:t>but don't rule out malice.”</a:t>
             </a:r>
-            <a:endParaRPr lang="en-GB" i="1" dirty="0"/>
-          </a:p>
-        </p:txBody>
-      </p:sp>
+            <a:endParaRPr lang="en-US" dirty="0"/>
+          </a:p>
+          <a:p>
+            <a:r>
+              <a:rPr lang="en-US" dirty="0"/>
+              <a:t>Other words: “Users are not necessarily bad people, maybe only idiots.”</a:t>
+            </a:r>
+            <a:endParaRPr lang="en-GB" dirty="0"/>
+          </a:p>
+        </p:txBody>
+      </p:sp>
+      <p:pic>
+        <p:nvPicPr>
+          <p:cNvPr id="6" name="Kép 5">
+            <a:extLst>
+              <a:ext uri="{FF2B5EF4-FFF2-40B4-BE49-F238E27FC236}">
+                <a16:creationId xmlns:a16="http://schemas.microsoft.com/office/drawing/2014/main" id="{EFBBB6AA-BEA0-46D1-A0AA-459AFC725109}"/>
+              </a:ext>
+            </a:extLst>
+          </p:cNvPr>
+          <p:cNvPicPr>
+            <a:picLocks noChangeAspect="1"/>
+          </p:cNvPicPr>
+          <p:nvPr/>
+        </p:nvPicPr>
+        <p:blipFill>
+          <a:blip r:embed="rId2">
+            <a:extLst>
+              <a:ext uri="{28A0092B-C50C-407E-A947-70E740481C1C}">
+                <a14:useLocalDpi xmlns:a14="http://schemas.microsoft.com/office/drawing/2010/main" val="0"/>
+              </a:ext>
+            </a:extLst>
+          </a:blip>
+          <a:stretch>
+            <a:fillRect/>
+          </a:stretch>
+        </p:blipFill>
+        <p:spPr>
+          <a:xfrm>
+            <a:off x="8545830" y="3087794"/>
+            <a:ext cx="2609850" cy="2781300"/>
+          </a:xfrm>
+          <a:prstGeom prst="rect">
+            <a:avLst/>
+          </a:prstGeom>
+        </p:spPr>
+      </p:pic>
     </p:spTree>
     <p:extLst>
       <p:ext uri="{BB962C8B-B14F-4D97-AF65-F5344CB8AC3E}">

</xml_diff>

<commit_message>
lightingtalk: add How To Sound Smart
</commit_message>
<xml_diff>
--- a/week-07/lightning-talk/Lightning Talk (SW Dev Laws) Arnold BARNA 2017-10-15.pptx
+++ b/week-07/lightning-talk/Lightning Talk (SW Dev Laws) Arnold BARNA 2017-10-15.pptx
@@ -5,18 +5,19 @@
     <p:sldMasterId id="2147483660" r:id="rId1"/>
   </p:sldMasterIdLst>
   <p:notesMasterIdLst>
-    <p:notesMasterId r:id="rId11"/>
+    <p:notesMasterId r:id="rId12"/>
   </p:notesMasterIdLst>
   <p:sldIdLst>
     <p:sldId id="256" r:id="rId2"/>
     <p:sldId id="294" r:id="rId3"/>
     <p:sldId id="258" r:id="rId4"/>
-    <p:sldId id="262" r:id="rId5"/>
-    <p:sldId id="283" r:id="rId6"/>
-    <p:sldId id="295" r:id="rId7"/>
+    <p:sldId id="283" r:id="rId5"/>
+    <p:sldId id="295" r:id="rId6"/>
+    <p:sldId id="298" r:id="rId7"/>
     <p:sldId id="296" r:id="rId8"/>
     <p:sldId id="297" r:id="rId9"/>
-    <p:sldId id="273" r:id="rId10"/>
+    <p:sldId id="299" r:id="rId10"/>
+    <p:sldId id="273" r:id="rId11"/>
   </p:sldIdLst>
   <p:sldSz cx="12192000" cy="6858000"/>
   <p:notesSz cx="6858000" cy="9144000"/>
@@ -209,7 +210,7 @@
           <a:p>
             <a:fld id="{6A2461C8-3853-49D3-8BEE-8D9ED78F07D0}" type="datetimeFigureOut">
               <a:rPr lang="en-GB" smtClean="0"/>
-              <a:t>16/10/2017</a:t>
+              <a:t>19/10/2017</a:t>
             </a:fld>
             <a:endParaRPr lang="en-GB"/>
           </a:p>
@@ -701,9 +702,9 @@
           <a:bodyPr/>
           <a:lstStyle/>
           <a:p>
-            <a:fld id="{45171105-4C99-459E-8C3A-C785AF6579B0}" type="datetime1">
+            <a:fld id="{B57CA957-0365-41CA-97CB-D86D474C452B}" type="datetime1">
               <a:rPr lang="en-GB" smtClean="0"/>
-              <a:t>16/10/2017</a:t>
+              <a:t>19/10/2017</a:t>
             </a:fld>
             <a:endParaRPr lang="en-GB"/>
           </a:p>
@@ -726,7 +727,7 @@
           <a:p>
             <a:r>
               <a:rPr lang="nb-NO"/>
-              <a:t>Lightning talk - Arnold BARNA - 2017-10-15</a:t>
+              <a:t>Lightning talk - Arnold BARNA - 2017-10-18</a:t>
             </a:r>
             <a:endParaRPr lang="en-GB"/>
           </a:p>
@@ -913,9 +914,9 @@
           <a:bodyPr/>
           <a:lstStyle/>
           <a:p>
-            <a:fld id="{C75520F9-BAAA-4E2E-81F0-1963441CCABD}" type="datetime1">
+            <a:fld id="{EE379CD6-1ABE-41CF-B96A-6D245957CAD9}" type="datetime1">
               <a:rPr lang="en-GB" smtClean="0"/>
-              <a:t>16/10/2017</a:t>
+              <a:t>19/10/2017</a:t>
             </a:fld>
             <a:endParaRPr lang="en-GB"/>
           </a:p>
@@ -938,7 +939,7 @@
           <a:p>
             <a:r>
               <a:rPr lang="nb-NO"/>
-              <a:t>Lightning talk - Arnold BARNA - 2017-10-15</a:t>
+              <a:t>Lightning talk - Arnold BARNA - 2017-10-18</a:t>
             </a:r>
             <a:endParaRPr lang="en-GB"/>
           </a:p>
@@ -1173,9 +1174,9 @@
           <a:bodyPr/>
           <a:lstStyle/>
           <a:p>
-            <a:fld id="{33DE7CFA-9DFE-400F-AB35-60654FC99333}" type="datetime1">
+            <a:fld id="{F6D85E5A-AE8A-42FF-BA69-0920F685F670}" type="datetime1">
               <a:rPr lang="en-GB" smtClean="0"/>
-              <a:t>16/10/2017</a:t>
+              <a:t>19/10/2017</a:t>
             </a:fld>
             <a:endParaRPr lang="en-GB"/>
           </a:p>
@@ -1198,7 +1199,7 @@
           <a:p>
             <a:r>
               <a:rPr lang="nb-NO"/>
-              <a:t>Lightning talk - Arnold BARNA - 2017-10-15</a:t>
+              <a:t>Lightning talk - Arnold BARNA - 2017-10-18</a:t>
             </a:r>
             <a:endParaRPr lang="en-GB"/>
           </a:p>
@@ -1351,9 +1352,9 @@
           <a:bodyPr/>
           <a:lstStyle/>
           <a:p>
-            <a:fld id="{C06A285D-1025-45A2-B3DA-E96E594BB942}" type="datetime1">
+            <a:fld id="{95F749E3-8B48-4B40-8B16-E5D59F132DDE}" type="datetime1">
               <a:rPr lang="en-GB" smtClean="0"/>
-              <a:t>16/10/2017</a:t>
+              <a:t>19/10/2017</a:t>
             </a:fld>
             <a:endParaRPr lang="en-GB"/>
           </a:p>
@@ -1376,7 +1377,7 @@
           <a:p>
             <a:r>
               <a:rPr lang="nb-NO"/>
-              <a:t>Lightning talk - Arnold BARNA - 2017-10-15</a:t>
+              <a:t>Lightning talk - Arnold BARNA - 2017-10-18</a:t>
             </a:r>
             <a:endParaRPr lang="en-GB"/>
           </a:p>
@@ -1698,9 +1699,9 @@
           <a:bodyPr/>
           <a:lstStyle/>
           <a:p>
-            <a:fld id="{558DF81A-CB98-433B-A0F3-1F8B4E63EB76}" type="datetime1">
+            <a:fld id="{962AC7D4-A038-400C-AECA-106F0F6DB184}" type="datetime1">
               <a:rPr lang="en-GB" smtClean="0"/>
-              <a:t>16/10/2017</a:t>
+              <a:t>19/10/2017</a:t>
             </a:fld>
             <a:endParaRPr lang="en-GB"/>
           </a:p>
@@ -1723,7 +1724,7 @@
           <a:p>
             <a:r>
               <a:rPr lang="nb-NO"/>
-              <a:t>Lightning talk - Arnold BARNA - 2017-10-15</a:t>
+              <a:t>Lightning talk - Arnold BARNA - 2017-10-18</a:t>
             </a:r>
             <a:endParaRPr lang="en-GB"/>
           </a:p>
@@ -1977,9 +1978,9 @@
           <a:bodyPr/>
           <a:lstStyle/>
           <a:p>
-            <a:fld id="{F43A802C-8080-491F-BF46-770DD8664778}" type="datetime1">
+            <a:fld id="{C061F1F1-83AB-4E73-94DF-A361424B7C2C}" type="datetime1">
               <a:rPr lang="en-GB" smtClean="0"/>
-              <a:t>16/10/2017</a:t>
+              <a:t>19/10/2017</a:t>
             </a:fld>
             <a:endParaRPr lang="en-GB"/>
           </a:p>
@@ -2002,7 +2003,7 @@
           <a:p>
             <a:r>
               <a:rPr lang="nb-NO"/>
-              <a:t>Lightning talk - Arnold BARNA - 2017-10-15</a:t>
+              <a:t>Lightning talk - Arnold BARNA - 2017-10-18</a:t>
             </a:r>
             <a:endParaRPr lang="en-GB"/>
           </a:p>
@@ -2360,9 +2361,9 @@
           <a:bodyPr/>
           <a:lstStyle/>
           <a:p>
-            <a:fld id="{1182AF20-C644-4B82-A093-D7BDF05ACAFE}" type="datetime1">
+            <a:fld id="{B3BF1BF5-762D-4735-BA4A-30E9C9404EAC}" type="datetime1">
               <a:rPr lang="en-GB" smtClean="0"/>
-              <a:t>16/10/2017</a:t>
+              <a:t>19/10/2017</a:t>
             </a:fld>
             <a:endParaRPr lang="en-GB"/>
           </a:p>
@@ -2385,7 +2386,7 @@
           <a:p>
             <a:r>
               <a:rPr lang="nb-NO"/>
-              <a:t>Lightning talk - Arnold BARNA - 2017-10-15</a:t>
+              <a:t>Lightning talk - Arnold BARNA - 2017-10-18</a:t>
             </a:r>
             <a:endParaRPr lang="en-GB"/>
           </a:p>
@@ -2482,9 +2483,9 @@
           <a:bodyPr/>
           <a:lstStyle/>
           <a:p>
-            <a:fld id="{8AEEF0D0-CDE7-4870-83F0-D17DA9453BFB}" type="datetime1">
+            <a:fld id="{B60A3F84-B1B7-4071-9903-AF00CF27777A}" type="datetime1">
               <a:rPr lang="en-GB" smtClean="0"/>
-              <a:t>16/10/2017</a:t>
+              <a:t>19/10/2017</a:t>
             </a:fld>
             <a:endParaRPr lang="en-GB"/>
           </a:p>
@@ -2507,7 +2508,7 @@
           <a:p>
             <a:r>
               <a:rPr lang="nb-NO"/>
-              <a:t>Lightning talk - Arnold BARNA - 2017-10-15</a:t>
+              <a:t>Lightning talk - Arnold BARNA - 2017-10-18</a:t>
             </a:r>
             <a:endParaRPr lang="en-GB"/>
           </a:p>
@@ -2657,9 +2658,9 @@
           <a:bodyPr/>
           <a:lstStyle/>
           <a:p>
-            <a:fld id="{95E515B6-867E-455D-861E-637EF3FAE21F}" type="datetime1">
+            <a:fld id="{D8D36308-A45B-490C-A709-D4547025B1EF}" type="datetime1">
               <a:rPr lang="en-GB" smtClean="0"/>
-              <a:t>16/10/2017</a:t>
+              <a:t>19/10/2017</a:t>
             </a:fld>
             <a:endParaRPr lang="en-GB"/>
           </a:p>
@@ -2690,7 +2691,7 @@
           <a:p>
             <a:r>
               <a:rPr lang="nb-NO"/>
-              <a:t>Lightning talk - Arnold BARNA - 2017-10-15</a:t>
+              <a:t>Lightning talk - Arnold BARNA - 2017-10-18</a:t>
             </a:r>
             <a:endParaRPr lang="en-GB"/>
           </a:p>
@@ -3015,9 +3016,9 @@
             </a:lvl1pPr>
           </a:lstStyle>
           <a:p>
-            <a:fld id="{BA601066-CDD8-4BBD-A491-94A18DB7B6DA}" type="datetime1">
+            <a:fld id="{DB1B8EA0-4836-4951-A78B-F66A23CF3A9D}" type="datetime1">
               <a:rPr lang="en-GB" smtClean="0"/>
-              <a:t>16/10/2017</a:t>
+              <a:t>19/10/2017</a:t>
             </a:fld>
             <a:endParaRPr lang="en-GB"/>
           </a:p>
@@ -3053,7 +3054,7 @@
           <a:p>
             <a:r>
               <a:rPr lang="nb-NO"/>
-              <a:t>Lightning talk - Arnold BARNA - 2017-10-15</a:t>
+              <a:t>Lightning talk - Arnold BARNA - 2017-10-18</a:t>
             </a:r>
             <a:endParaRPr lang="en-GB"/>
           </a:p>
@@ -3401,9 +3402,9 @@
           <a:bodyPr/>
           <a:lstStyle/>
           <a:p>
-            <a:fld id="{4EAC112E-DF81-4BA2-838F-13778EF28FFD}" type="datetime1">
+            <a:fld id="{60F79322-CBFC-4F98-B0DB-6C502D06D885}" type="datetime1">
               <a:rPr lang="en-GB" smtClean="0"/>
-              <a:t>16/10/2017</a:t>
+              <a:t>19/10/2017</a:t>
             </a:fld>
             <a:endParaRPr lang="en-GB"/>
           </a:p>
@@ -3426,7 +3427,7 @@
           <a:p>
             <a:r>
               <a:rPr lang="nb-NO"/>
-              <a:t>Lightning talk - Arnold BARNA - 2017-10-15</a:t>
+              <a:t>Lightning talk - Arnold BARNA - 2017-10-18</a:t>
             </a:r>
             <a:endParaRPr lang="en-GB"/>
           </a:p>
@@ -3692,9 +3693,9 @@
             </a:lvl1pPr>
           </a:lstStyle>
           <a:p>
-            <a:fld id="{FC6EC7CC-945F-466C-9243-B570A10D2678}" type="datetime1">
+            <a:fld id="{665A07CD-B65C-4B12-8213-E769D4B3479B}" type="datetime1">
               <a:rPr lang="en-GB" smtClean="0"/>
-              <a:t>16/10/2017</a:t>
+              <a:t>19/10/2017</a:t>
             </a:fld>
             <a:endParaRPr lang="en-GB"/>
           </a:p>
@@ -3733,7 +3734,7 @@
           <a:p>
             <a:r>
               <a:rPr lang="nb-NO"/>
-              <a:t>Lightning talk - Arnold BARNA - 2017-10-15</a:t>
+              <a:t>Lightning talk - Arnold BARNA - 2017-10-18</a:t>
             </a:r>
             <a:endParaRPr lang="en-GB"/>
           </a:p>
@@ -4246,8 +4247,15 @@
           <a:p>
             <a:r>
               <a:rPr lang="en-GB" dirty="0"/>
-              <a:t>How To Sound Smart</a:t>
-            </a:r>
+              <a:t>How To Sound Smart </a:t>
+            </a:r>
+            <a:r>
+              <a:rPr lang="hu-HU" dirty="0">
+                <a:sym typeface="Wingdings" panose="05000000000000000000" pitchFamily="2" charset="2"/>
+              </a:rPr>
+              <a:t></a:t>
+            </a:r>
+            <a:endParaRPr lang="en-GB" dirty="0"/>
           </a:p>
         </p:txBody>
       </p:sp>
@@ -4286,7 +4294,7 @@
             </a:r>
             <a:r>
               <a:rPr lang="hu-HU" dirty="0"/>
-              <a:t>15</a:t>
+              <a:t>18</a:t>
             </a:r>
             <a:endParaRPr lang="en-US" dirty="0"/>
           </a:p>
@@ -4303,6 +4311,214 @@
     <p:extLst>
       <p:ext uri="{BB962C8B-B14F-4D97-AF65-F5344CB8AC3E}">
         <p14:creationId xmlns:p14="http://schemas.microsoft.com/office/powerpoint/2010/main" val="2938431741"/>
+      </p:ext>
+    </p:extLst>
+  </p:cSld>
+  <p:clrMapOvr>
+    <a:masterClrMapping/>
+  </p:clrMapOvr>
+</p:sld>
+</file>
+
+<file path=ppt/slides/slide10.xml><?xml version="1.0" encoding="utf-8"?>
+<p:sld xmlns:a="http://schemas.openxmlformats.org/drawingml/2006/main" xmlns:r="http://schemas.openxmlformats.org/officeDocument/2006/relationships" xmlns:p="http://schemas.openxmlformats.org/presentationml/2006/main">
+  <p:cSld>
+    <p:spTree>
+      <p:nvGrpSpPr>
+        <p:cNvPr id="1" name=""/>
+        <p:cNvGrpSpPr/>
+        <p:nvPr/>
+      </p:nvGrpSpPr>
+      <p:grpSpPr>
+        <a:xfrm>
+          <a:off x="0" y="0"/>
+          <a:ext cx="0" cy="0"/>
+          <a:chOff x="0" y="0"/>
+          <a:chExt cx="0" cy="0"/>
+        </a:xfrm>
+      </p:grpSpPr>
+      <p:sp>
+        <p:nvSpPr>
+          <p:cNvPr id="2" name="Cím 1">
+            <a:extLst>
+              <a:ext uri="{FF2B5EF4-FFF2-40B4-BE49-F238E27FC236}">
+                <a16:creationId xmlns:a16="http://schemas.microsoft.com/office/drawing/2014/main" id="{0525D335-DEE6-431F-9D28-6D74ED158BF7}"/>
+              </a:ext>
+            </a:extLst>
+          </p:cNvPr>
+          <p:cNvSpPr>
+            <a:spLocks noGrp="1"/>
+          </p:cNvSpPr>
+          <p:nvPr>
+            <p:ph type="title"/>
+          </p:nvPr>
+        </p:nvSpPr>
+        <p:spPr/>
+        <p:txBody>
+          <a:bodyPr/>
+          <a:lstStyle/>
+          <a:p>
+            <a:r>
+              <a:rPr lang="en-US" dirty="0"/>
+              <a:t>Thank you for the attention</a:t>
+            </a:r>
+            <a:endParaRPr lang="en-GB" dirty="0"/>
+          </a:p>
+        </p:txBody>
+      </p:sp>
+      <p:sp>
+        <p:nvSpPr>
+          <p:cNvPr id="3" name="Tartalom helye 2">
+            <a:extLst>
+              <a:ext uri="{FF2B5EF4-FFF2-40B4-BE49-F238E27FC236}">
+                <a16:creationId xmlns:a16="http://schemas.microsoft.com/office/drawing/2014/main" id="{84B4C02B-37FC-4670-A393-9F8D1E45892E}"/>
+              </a:ext>
+            </a:extLst>
+          </p:cNvPr>
+          <p:cNvSpPr>
+            <a:spLocks noGrp="1"/>
+          </p:cNvSpPr>
+          <p:nvPr>
+            <p:ph idx="1"/>
+          </p:nvPr>
+        </p:nvSpPr>
+        <p:spPr/>
+        <p:txBody>
+          <a:bodyPr/>
+          <a:lstStyle/>
+          <a:p>
+            <a:endParaRPr lang="en-US" dirty="0"/>
+          </a:p>
+          <a:p>
+            <a:endParaRPr lang="en-US" dirty="0"/>
+          </a:p>
+          <a:p>
+            <a:pPr marL="0" indent="0">
+              <a:buNone/>
+            </a:pPr>
+            <a:r>
+              <a:rPr lang="en-US" dirty="0"/>
+              <a:t>Available on GitHub:</a:t>
+            </a:r>
+          </a:p>
+          <a:p>
+            <a:pPr marL="0" indent="0">
+              <a:buNone/>
+            </a:pPr>
+            <a:endParaRPr lang="en-US" dirty="0"/>
+          </a:p>
+          <a:p>
+            <a:pPr marL="0" indent="0">
+              <a:buNone/>
+            </a:pPr>
+            <a:r>
+              <a:rPr lang="en-US" dirty="0"/>
+              <a:t>Code:</a:t>
+            </a:r>
+          </a:p>
+          <a:p>
+            <a:pPr lvl="1"/>
+            <a:r>
+              <a:rPr lang="en-US" dirty="0">
+                <a:hlinkClick r:id="rId2"/>
+              </a:rPr>
+              <a:t>https://github.com/greenfox-academy/</a:t>
+            </a:r>
+            <a:r>
+              <a:rPr lang="en-US" b="1" dirty="0">
+                <a:hlinkClick r:id="rId2"/>
+              </a:rPr>
+              <a:t>bramble100</a:t>
+            </a:r>
+            <a:r>
+              <a:rPr lang="en-US" dirty="0">
+                <a:hlinkClick r:id="rId2"/>
+              </a:rPr>
+              <a:t>/tree/master/week-07/</a:t>
+            </a:r>
+            <a:r>
+              <a:rPr lang="en-US" b="1" dirty="0">
+                <a:hlinkClick r:id="rId2"/>
+              </a:rPr>
+              <a:t>lightning-talk</a:t>
+            </a:r>
+            <a:endParaRPr lang="en-US" b="1" dirty="0"/>
+          </a:p>
+          <a:p>
+            <a:pPr marL="0" indent="0">
+              <a:buNone/>
+            </a:pPr>
+            <a:r>
+              <a:rPr lang="en-US" dirty="0"/>
+              <a:t>Slides:</a:t>
+            </a:r>
+          </a:p>
+          <a:p>
+            <a:pPr lvl="1"/>
+            <a:r>
+              <a:rPr lang="en-US" dirty="0">
+                <a:hlinkClick r:id="rId2"/>
+              </a:rPr>
+              <a:t>https://github.com/greenfox-academy/</a:t>
+            </a:r>
+            <a:r>
+              <a:rPr lang="en-US" b="1" dirty="0">
+                <a:hlinkClick r:id="rId2"/>
+              </a:rPr>
+              <a:t>bramble100</a:t>
+            </a:r>
+            <a:r>
+              <a:rPr lang="en-US" dirty="0">
+                <a:hlinkClick r:id="rId2"/>
+              </a:rPr>
+              <a:t>/tree/master/week-07/</a:t>
+            </a:r>
+            <a:r>
+              <a:rPr lang="en-US" b="1" dirty="0">
+                <a:hlinkClick r:id="rId2"/>
+              </a:rPr>
+              <a:t>lightning-talk</a:t>
+            </a:r>
+            <a:endParaRPr lang="en-US" b="1" dirty="0"/>
+          </a:p>
+          <a:p>
+            <a:endParaRPr lang="en-US" dirty="0"/>
+          </a:p>
+        </p:txBody>
+      </p:sp>
+      <p:sp>
+        <p:nvSpPr>
+          <p:cNvPr id="4" name="Élőláb helye 3">
+            <a:extLst>
+              <a:ext uri="{FF2B5EF4-FFF2-40B4-BE49-F238E27FC236}">
+                <a16:creationId xmlns:a16="http://schemas.microsoft.com/office/drawing/2014/main" id="{66958B78-773B-41D6-AF3F-17D823913A86}"/>
+              </a:ext>
+            </a:extLst>
+          </p:cNvPr>
+          <p:cNvSpPr>
+            <a:spLocks noGrp="1"/>
+          </p:cNvSpPr>
+          <p:nvPr>
+            <p:ph type="ftr" sz="quarter" idx="11"/>
+          </p:nvPr>
+        </p:nvSpPr>
+        <p:spPr/>
+        <p:txBody>
+          <a:bodyPr/>
+          <a:lstStyle/>
+          <a:p>
+            <a:r>
+              <a:rPr lang="nb-NO"/>
+              <a:t>Lightning talk - Arnold BARNA - 2017-10-18</a:t>
+            </a:r>
+            <a:endParaRPr lang="en-GB"/>
+          </a:p>
+        </p:txBody>
+      </p:sp>
+    </p:spTree>
+    <p:extLst>
+      <p:ext uri="{BB962C8B-B14F-4D97-AF65-F5344CB8AC3E}">
+        <p14:creationId xmlns:p14="http://schemas.microsoft.com/office/powerpoint/2010/main" val="3995058408"/>
       </p:ext>
     </p:extLst>
   </p:cSld>
@@ -4366,6 +4582,16 @@
               <a:rPr lang="hu-HU" dirty="0" err="1"/>
               <a:t>wirken</a:t>
             </a:r>
+            <a:r>
+              <a:rPr lang="hu-HU" dirty="0"/>
+              <a:t> </a:t>
+            </a:r>
+            <a:r>
+              <a:rPr lang="hu-HU" dirty="0">
+                <a:sym typeface="Wingdings" panose="05000000000000000000" pitchFamily="2" charset="2"/>
+              </a:rPr>
+              <a:t></a:t>
+            </a:r>
             <a:endParaRPr lang="en-GB" dirty="0"/>
           </a:p>
         </p:txBody>
@@ -4417,7 +4643,7 @@
             </a:r>
             <a:r>
               <a:rPr lang="hu-HU" dirty="0"/>
-              <a:t>15</a:t>
+              <a:t>18</a:t>
             </a:r>
             <a:endParaRPr lang="en-US" dirty="0"/>
           </a:p>
@@ -4434,6 +4660,42 @@
           </a:p>
         </p:txBody>
       </p:sp>
+      <p:pic>
+        <p:nvPicPr>
+          <p:cNvPr id="9" name="Kép 8">
+            <a:extLst>
+              <a:ext uri="{FF2B5EF4-FFF2-40B4-BE49-F238E27FC236}">
+                <a16:creationId xmlns:a16="http://schemas.microsoft.com/office/drawing/2014/main" id="{A67BE7B7-732E-43A5-91DA-6421BFB21965}"/>
+              </a:ext>
+            </a:extLst>
+          </p:cNvPr>
+          <p:cNvPicPr>
+            <a:picLocks noChangeAspect="1"/>
+          </p:cNvPicPr>
+          <p:nvPr/>
+        </p:nvPicPr>
+        <p:blipFill>
+          <a:blip r:embed="rId2">
+            <a:extLst>
+              <a:ext uri="{28A0092B-C50C-407E-A947-70E740481C1C}">
+                <a14:useLocalDpi xmlns:a14="http://schemas.microsoft.com/office/drawing/2010/main" val="0"/>
+              </a:ext>
+            </a:extLst>
+          </a:blip>
+          <a:stretch>
+            <a:fillRect/>
+          </a:stretch>
+        </p:blipFill>
+        <p:spPr>
+          <a:xfrm>
+            <a:off x="9364980" y="758952"/>
+            <a:ext cx="1790700" cy="1076325"/>
+          </a:xfrm>
+          <a:prstGeom prst="rect">
+            <a:avLst/>
+          </a:prstGeom>
+        </p:spPr>
+      </p:pic>
     </p:spTree>
     <p:extLst>
       <p:ext uri="{BB962C8B-B14F-4D97-AF65-F5344CB8AC3E}">
@@ -4679,12 +4941,48 @@
           <a:p>
             <a:r>
               <a:rPr lang="nb-NO"/>
-              <a:t>Lightning talk - Arnold BARNA - 2017-10-15</a:t>
+              <a:t>Lightning talk - Arnold BARNA - 2017-10-18</a:t>
             </a:r>
             <a:endParaRPr lang="en-GB" dirty="0"/>
           </a:p>
         </p:txBody>
       </p:sp>
+      <p:pic>
+        <p:nvPicPr>
+          <p:cNvPr id="5" name="Kép 4">
+            <a:extLst>
+              <a:ext uri="{FF2B5EF4-FFF2-40B4-BE49-F238E27FC236}">
+                <a16:creationId xmlns:a16="http://schemas.microsoft.com/office/drawing/2014/main" id="{5EEC897B-7FEB-422F-8F09-CE876A196D8C}"/>
+              </a:ext>
+            </a:extLst>
+          </p:cNvPr>
+          <p:cNvPicPr>
+            <a:picLocks noChangeAspect="1"/>
+          </p:cNvPicPr>
+          <p:nvPr/>
+        </p:nvPicPr>
+        <p:blipFill>
+          <a:blip r:embed="rId2">
+            <a:extLst>
+              <a:ext uri="{28A0092B-C50C-407E-A947-70E740481C1C}">
+                <a14:useLocalDpi xmlns:a14="http://schemas.microsoft.com/office/drawing/2010/main" val="0"/>
+              </a:ext>
+            </a:extLst>
+          </a:blip>
+          <a:stretch>
+            <a:fillRect/>
+          </a:stretch>
+        </p:blipFill>
+        <p:spPr>
+          <a:xfrm>
+            <a:off x="8012430" y="1845734"/>
+            <a:ext cx="3143250" cy="3895725"/>
+          </a:xfrm>
+          <a:prstGeom prst="rect">
+            <a:avLst/>
+          </a:prstGeom>
+        </p:spPr>
+      </p:pic>
     </p:spTree>
     <p:extLst>
       <p:ext uri="{BB962C8B-B14F-4D97-AF65-F5344CB8AC3E}">
@@ -4720,203 +5018,6 @@
           <p:cNvPr id="2" name="Cím 1">
             <a:extLst>
               <a:ext uri="{FF2B5EF4-FFF2-40B4-BE49-F238E27FC236}">
-                <a16:creationId xmlns:a16="http://schemas.microsoft.com/office/drawing/2014/main" id="{9798E4E8-65B6-4151-97D1-F641669F6496}"/>
-              </a:ext>
-            </a:extLst>
-          </p:cNvPr>
-          <p:cNvSpPr>
-            <a:spLocks noGrp="1"/>
-          </p:cNvSpPr>
-          <p:nvPr>
-            <p:ph type="title"/>
-          </p:nvPr>
-        </p:nvSpPr>
-        <p:spPr/>
-        <p:txBody>
-          <a:bodyPr/>
-          <a:lstStyle/>
-          <a:p>
-            <a:r>
-              <a:rPr lang="en-US" dirty="0"/>
-              <a:t>Occam's Razor</a:t>
-            </a:r>
-          </a:p>
-        </p:txBody>
-      </p:sp>
-      <p:sp>
-        <p:nvSpPr>
-          <p:cNvPr id="4" name="Élőláb helye 3">
-            <a:extLst>
-              <a:ext uri="{FF2B5EF4-FFF2-40B4-BE49-F238E27FC236}">
-                <a16:creationId xmlns:a16="http://schemas.microsoft.com/office/drawing/2014/main" id="{8563BF33-0F38-48DE-A6F1-4682B2A86604}"/>
-              </a:ext>
-            </a:extLst>
-          </p:cNvPr>
-          <p:cNvSpPr>
-            <a:spLocks noGrp="1"/>
-          </p:cNvSpPr>
-          <p:nvPr>
-            <p:ph type="ftr" sz="quarter" idx="11"/>
-          </p:nvPr>
-        </p:nvSpPr>
-        <p:spPr/>
-        <p:txBody>
-          <a:bodyPr/>
-          <a:lstStyle/>
-          <a:p>
-            <a:r>
-              <a:rPr lang="nb-NO"/>
-              <a:t>Lightning talk - Arnold BARNA - 2017-10-15</a:t>
-            </a:r>
-            <a:endParaRPr lang="en-GB"/>
-          </a:p>
-        </p:txBody>
-      </p:sp>
-      <p:sp>
-        <p:nvSpPr>
-          <p:cNvPr id="5" name="Tartalom helye 4">
-            <a:extLst>
-              <a:ext uri="{FF2B5EF4-FFF2-40B4-BE49-F238E27FC236}">
-                <a16:creationId xmlns:a16="http://schemas.microsoft.com/office/drawing/2014/main" id="{5126B34B-F5DF-4A2D-83F5-48F8EA2CC0F0}"/>
-              </a:ext>
-            </a:extLst>
-          </p:cNvPr>
-          <p:cNvSpPr>
-            <a:spLocks noGrp="1"/>
-          </p:cNvSpPr>
-          <p:nvPr>
-            <p:ph idx="1"/>
-          </p:nvPr>
-        </p:nvSpPr>
-        <p:spPr/>
-        <p:txBody>
-          <a:bodyPr/>
-          <a:lstStyle/>
-          <a:p>
-            <a:r>
-              <a:rPr lang="hu-HU" dirty="0"/>
-              <a:t>L</a:t>
-            </a:r>
-            <a:r>
-              <a:rPr lang="en-GB" dirty="0"/>
-              <a:t>aw of parsimony</a:t>
-            </a:r>
-            <a:r>
-              <a:rPr lang="hu-HU" dirty="0"/>
-              <a:t>: </a:t>
-            </a:r>
-            <a:r>
-              <a:rPr lang="en-US" i="1" dirty="0"/>
-              <a:t>“The simplest explanation is usually the correct one.”</a:t>
-            </a:r>
-            <a:endParaRPr lang="hu-HU" i="1" dirty="0"/>
-          </a:p>
-          <a:p>
-            <a:r>
-              <a:rPr lang="en-US" i="1" dirty="0"/>
-              <a:t>“When you hear hoofbeats, think of horses not zebras</a:t>
-            </a:r>
-            <a:r>
-              <a:rPr lang="hu-HU" i="1" dirty="0"/>
-              <a:t>.</a:t>
-            </a:r>
-            <a:r>
-              <a:rPr lang="en-US" i="1" dirty="0"/>
-              <a:t>”</a:t>
-            </a:r>
-            <a:endParaRPr lang="hu-HU" i="1" dirty="0"/>
-          </a:p>
-          <a:p>
-            <a:r>
-              <a:rPr lang="hu-HU" dirty="0" err="1"/>
-              <a:t>Other</a:t>
-            </a:r>
-            <a:r>
-              <a:rPr lang="hu-HU" dirty="0"/>
-              <a:t> </a:t>
-            </a:r>
-            <a:r>
-              <a:rPr lang="hu-HU" dirty="0" err="1"/>
-              <a:t>words</a:t>
-            </a:r>
-            <a:r>
-              <a:rPr lang="hu-HU" dirty="0"/>
-              <a:t>: KISS</a:t>
-            </a:r>
-          </a:p>
-        </p:txBody>
-      </p:sp>
-      <p:pic>
-        <p:nvPicPr>
-          <p:cNvPr id="6" name="Kép 5">
-            <a:extLst>
-              <a:ext uri="{FF2B5EF4-FFF2-40B4-BE49-F238E27FC236}">
-                <a16:creationId xmlns:a16="http://schemas.microsoft.com/office/drawing/2014/main" id="{AB934350-656B-44BF-80FF-598F14F8174D}"/>
-              </a:ext>
-            </a:extLst>
-          </p:cNvPr>
-          <p:cNvPicPr>
-            <a:picLocks noChangeAspect="1"/>
-          </p:cNvPicPr>
-          <p:nvPr/>
-        </p:nvPicPr>
-        <p:blipFill>
-          <a:blip r:embed="rId2">
-            <a:extLst>
-              <a:ext uri="{28A0092B-C50C-407E-A947-70E740481C1C}">
-                <a14:useLocalDpi xmlns:a14="http://schemas.microsoft.com/office/drawing/2010/main" val="0"/>
-              </a:ext>
-            </a:extLst>
-          </a:blip>
-          <a:stretch>
-            <a:fillRect/>
-          </a:stretch>
-        </p:blipFill>
-        <p:spPr>
-          <a:xfrm>
-            <a:off x="7529208" y="2440038"/>
-            <a:ext cx="3677271" cy="3429055"/>
-          </a:xfrm>
-          <a:prstGeom prst="rect">
-            <a:avLst/>
-          </a:prstGeom>
-        </p:spPr>
-      </p:pic>
-    </p:spTree>
-    <p:extLst>
-      <p:ext uri="{BB962C8B-B14F-4D97-AF65-F5344CB8AC3E}">
-        <p14:creationId xmlns:p14="http://schemas.microsoft.com/office/powerpoint/2010/main" val="3532173075"/>
-      </p:ext>
-    </p:extLst>
-  </p:cSld>
-  <p:clrMapOvr>
-    <a:masterClrMapping/>
-  </p:clrMapOvr>
-</p:sld>
-</file>
-
-<file path=ppt/slides/slide5.xml><?xml version="1.0" encoding="utf-8"?>
-<p:sld xmlns:a="http://schemas.openxmlformats.org/drawingml/2006/main" xmlns:r="http://schemas.openxmlformats.org/officeDocument/2006/relationships" xmlns:p="http://schemas.openxmlformats.org/presentationml/2006/main">
-  <p:cSld>
-    <p:spTree>
-      <p:nvGrpSpPr>
-        <p:cNvPr id="1" name=""/>
-        <p:cNvGrpSpPr/>
-        <p:nvPr/>
-      </p:nvGrpSpPr>
-      <p:grpSpPr>
-        <a:xfrm>
-          <a:off x="0" y="0"/>
-          <a:ext cx="0" cy="0"/>
-          <a:chOff x="0" y="0"/>
-          <a:chExt cx="0" cy="0"/>
-        </a:xfrm>
-      </p:grpSpPr>
-      <p:sp>
-        <p:nvSpPr>
-          <p:cNvPr id="2" name="Cím 1">
-            <a:extLst>
-              <a:ext uri="{FF2B5EF4-FFF2-40B4-BE49-F238E27FC236}">
                 <a16:creationId xmlns:a16="http://schemas.microsoft.com/office/drawing/2014/main" id="{E5A24DA7-99D0-4B1C-8657-CEA9F3F30441}"/>
               </a:ext>
             </a:extLst>
@@ -4964,7 +5065,7 @@
           <a:p>
             <a:r>
               <a:rPr lang="nb-NO"/>
-              <a:t>Lightning talk - Arnold BARNA - 2017-10-15</a:t>
+              <a:t>Lightning talk - Arnold BARNA - 2017-10-18</a:t>
             </a:r>
             <a:endParaRPr lang="en-GB"/>
           </a:p>
@@ -4986,27 +5087,27 @@
             <p:ph idx="1"/>
           </p:nvPr>
         </p:nvSpPr>
-        <p:spPr/>
-        <p:txBody>
-          <a:bodyPr/>
-          <a:lstStyle/>
-          <a:p>
-            <a:r>
-              <a:rPr lang="en-US" dirty="0"/>
-              <a:t>“Never attribute to malice that which can be adequately explained by stupidity, </a:t>
-            </a:r>
-            <a:r>
-              <a:rPr lang="en-US" i="1" dirty="0"/>
-              <a:t>but don't rule out malice.”</a:t>
-            </a:r>
-            <a:endParaRPr lang="en-US" dirty="0"/>
-          </a:p>
-          <a:p>
-            <a:r>
-              <a:rPr lang="en-US" dirty="0"/>
-              <a:t>Other words: “Users are not necessarily bad people, maybe only idiots.”</a:t>
-            </a:r>
-            <a:endParaRPr lang="en-GB" dirty="0"/>
+        <p:spPr>
+          <a:xfrm>
+            <a:off x="1097280" y="1845734"/>
+            <a:ext cx="7001691" cy="1513286"/>
+          </a:xfrm>
+        </p:spPr>
+        <p:txBody>
+          <a:bodyPr>
+            <a:normAutofit/>
+          </a:bodyPr>
+          <a:lstStyle/>
+          <a:p>
+            <a:r>
+              <a:rPr lang="en-US" sz="3200" dirty="0"/>
+              <a:t>“Never attribute to malice that which can be adequately explained by stupidity</a:t>
+            </a:r>
+            <a:r>
+              <a:rPr lang="en-US" sz="3200" i="1" dirty="0"/>
+              <a:t>.”</a:t>
+            </a:r>
+            <a:endParaRPr lang="en-US" sz="3200" dirty="0"/>
           </a:p>
         </p:txBody>
       </p:sp>
@@ -5046,6 +5147,327 @@
           </a:prstGeom>
         </p:spPr>
       </p:pic>
+      <p:sp>
+        <p:nvSpPr>
+          <p:cNvPr id="3" name="Szövegdoboz 2">
+            <a:extLst>
+              <a:ext uri="{FF2B5EF4-FFF2-40B4-BE49-F238E27FC236}">
+                <a16:creationId xmlns:a16="http://schemas.microsoft.com/office/drawing/2014/main" id="{91A16F92-D563-46C9-8D39-91E9F791E65F}"/>
+              </a:ext>
+            </a:extLst>
+          </p:cNvPr>
+          <p:cNvSpPr txBox="1"/>
+          <p:nvPr/>
+        </p:nvSpPr>
+        <p:spPr>
+          <a:xfrm>
+            <a:off x="1097280" y="3788229"/>
+            <a:ext cx="6955038" cy="1569660"/>
+          </a:xfrm>
+          <a:prstGeom prst="rect">
+            <a:avLst/>
+          </a:prstGeom>
+          <a:noFill/>
+        </p:spPr>
+        <p:txBody>
+          <a:bodyPr wrap="square" rtlCol="0">
+            <a:spAutoFit/>
+          </a:bodyPr>
+          <a:lstStyle/>
+          <a:p>
+            <a:r>
+              <a:rPr lang="en-US" sz="3200" dirty="0"/>
+              <a:t>In other words: “Users are not necessarily bad people, maybe only harmless idiots.”</a:t>
+            </a:r>
+          </a:p>
+        </p:txBody>
+      </p:sp>
+      <p:sp>
+        <p:nvSpPr>
+          <p:cNvPr id="7" name="Tartalom helye 4">
+            <a:extLst>
+              <a:ext uri="{FF2B5EF4-FFF2-40B4-BE49-F238E27FC236}">
+                <a16:creationId xmlns:a16="http://schemas.microsoft.com/office/drawing/2014/main" id="{05CB0824-A2B3-43F8-971D-114B5AEA1A20}"/>
+              </a:ext>
+            </a:extLst>
+          </p:cNvPr>
+          <p:cNvSpPr txBox="1">
+            <a:spLocks/>
+          </p:cNvSpPr>
+          <p:nvPr/>
+        </p:nvSpPr>
+        <p:spPr>
+          <a:xfrm>
+            <a:off x="1097280" y="1840558"/>
+            <a:ext cx="7001691" cy="1513286"/>
+          </a:xfrm>
+          <a:prstGeom prst="rect">
+            <a:avLst/>
+          </a:prstGeom>
+        </p:spPr>
+        <p:txBody>
+          <a:bodyPr vert="horz" lIns="0" tIns="45720" rIns="0" bIns="45720" rtlCol="0">
+            <a:normAutofit/>
+          </a:bodyPr>
+          <a:lstStyle>
+            <a:lvl1pPr marL="91440" indent="-91440" algn="l" defTabSz="914400" rtl="0" eaLnBrk="1" latinLnBrk="0" hangingPunct="1">
+              <a:lnSpc>
+                <a:spcPct val="90000"/>
+              </a:lnSpc>
+              <a:spcBef>
+                <a:spcPts val="1200"/>
+              </a:spcBef>
+              <a:spcAft>
+                <a:spcPts val="200"/>
+              </a:spcAft>
+              <a:buClr>
+                <a:schemeClr val="accent1"/>
+              </a:buClr>
+              <a:buSzPct val="100000"/>
+              <a:buFont typeface="Calibri" panose="020F0502020204030204" pitchFamily="34" charset="0"/>
+              <a:buChar char=" "/>
+              <a:defRPr sz="2000" kern="1200">
+                <a:solidFill>
+                  <a:schemeClr val="tx1">
+                    <a:lumMod val="75000"/>
+                    <a:lumOff val="25000"/>
+                  </a:schemeClr>
+                </a:solidFill>
+                <a:latin typeface="+mn-lt"/>
+                <a:ea typeface="+mn-ea"/>
+                <a:cs typeface="+mn-cs"/>
+              </a:defRPr>
+            </a:lvl1pPr>
+            <a:lvl2pPr marL="384048" indent="-182880" algn="l" defTabSz="914400" rtl="0" eaLnBrk="1" latinLnBrk="0" hangingPunct="1">
+              <a:lnSpc>
+                <a:spcPct val="90000"/>
+              </a:lnSpc>
+              <a:spcBef>
+                <a:spcPts val="200"/>
+              </a:spcBef>
+              <a:spcAft>
+                <a:spcPts val="400"/>
+              </a:spcAft>
+              <a:buClr>
+                <a:schemeClr val="accent1"/>
+              </a:buClr>
+              <a:buFont typeface="Calibri" pitchFamily="34" charset="0"/>
+              <a:buChar char="◦"/>
+              <a:defRPr sz="1800" kern="1200">
+                <a:solidFill>
+                  <a:schemeClr val="tx1">
+                    <a:lumMod val="75000"/>
+                    <a:lumOff val="25000"/>
+                  </a:schemeClr>
+                </a:solidFill>
+                <a:latin typeface="+mn-lt"/>
+                <a:ea typeface="+mn-ea"/>
+                <a:cs typeface="+mn-cs"/>
+              </a:defRPr>
+            </a:lvl2pPr>
+            <a:lvl3pPr marL="566928" indent="-182880" algn="l" defTabSz="914400" rtl="0" eaLnBrk="1" latinLnBrk="0" hangingPunct="1">
+              <a:lnSpc>
+                <a:spcPct val="90000"/>
+              </a:lnSpc>
+              <a:spcBef>
+                <a:spcPts val="200"/>
+              </a:spcBef>
+              <a:spcAft>
+                <a:spcPts val="400"/>
+              </a:spcAft>
+              <a:buClr>
+                <a:schemeClr val="accent1"/>
+              </a:buClr>
+              <a:buFont typeface="Calibri" pitchFamily="34" charset="0"/>
+              <a:buChar char="◦"/>
+              <a:defRPr sz="1400" kern="1200">
+                <a:solidFill>
+                  <a:schemeClr val="tx1">
+                    <a:lumMod val="75000"/>
+                    <a:lumOff val="25000"/>
+                  </a:schemeClr>
+                </a:solidFill>
+                <a:latin typeface="+mn-lt"/>
+                <a:ea typeface="+mn-ea"/>
+                <a:cs typeface="+mn-cs"/>
+              </a:defRPr>
+            </a:lvl3pPr>
+            <a:lvl4pPr marL="749808" indent="-182880" algn="l" defTabSz="914400" rtl="0" eaLnBrk="1" latinLnBrk="0" hangingPunct="1">
+              <a:lnSpc>
+                <a:spcPct val="90000"/>
+              </a:lnSpc>
+              <a:spcBef>
+                <a:spcPts val="200"/>
+              </a:spcBef>
+              <a:spcAft>
+                <a:spcPts val="400"/>
+              </a:spcAft>
+              <a:buClr>
+                <a:schemeClr val="accent1"/>
+              </a:buClr>
+              <a:buFont typeface="Calibri" pitchFamily="34" charset="0"/>
+              <a:buChar char="◦"/>
+              <a:defRPr sz="1400" kern="1200">
+                <a:solidFill>
+                  <a:schemeClr val="tx1">
+                    <a:lumMod val="75000"/>
+                    <a:lumOff val="25000"/>
+                  </a:schemeClr>
+                </a:solidFill>
+                <a:latin typeface="+mn-lt"/>
+                <a:ea typeface="+mn-ea"/>
+                <a:cs typeface="+mn-cs"/>
+              </a:defRPr>
+            </a:lvl4pPr>
+            <a:lvl5pPr marL="932688" indent="-182880" algn="l" defTabSz="914400" rtl="0" eaLnBrk="1" latinLnBrk="0" hangingPunct="1">
+              <a:lnSpc>
+                <a:spcPct val="90000"/>
+              </a:lnSpc>
+              <a:spcBef>
+                <a:spcPts val="200"/>
+              </a:spcBef>
+              <a:spcAft>
+                <a:spcPts val="400"/>
+              </a:spcAft>
+              <a:buClr>
+                <a:schemeClr val="accent1"/>
+              </a:buClr>
+              <a:buFont typeface="Calibri" pitchFamily="34" charset="0"/>
+              <a:buChar char="◦"/>
+              <a:defRPr sz="1400" kern="1200">
+                <a:solidFill>
+                  <a:schemeClr val="tx1">
+                    <a:lumMod val="75000"/>
+                    <a:lumOff val="25000"/>
+                  </a:schemeClr>
+                </a:solidFill>
+                <a:latin typeface="+mn-lt"/>
+                <a:ea typeface="+mn-ea"/>
+                <a:cs typeface="+mn-cs"/>
+              </a:defRPr>
+            </a:lvl5pPr>
+            <a:lvl6pPr marL="1100000" indent="-228600" algn="l" defTabSz="914400" rtl="0" eaLnBrk="1" latinLnBrk="0" hangingPunct="1">
+              <a:lnSpc>
+                <a:spcPct val="90000"/>
+              </a:lnSpc>
+              <a:spcBef>
+                <a:spcPts val="200"/>
+              </a:spcBef>
+              <a:spcAft>
+                <a:spcPts val="400"/>
+              </a:spcAft>
+              <a:buClr>
+                <a:schemeClr val="accent1"/>
+              </a:buClr>
+              <a:buFont typeface="Calibri" pitchFamily="34" charset="0"/>
+              <a:buChar char="◦"/>
+              <a:defRPr sz="1400" kern="1200">
+                <a:solidFill>
+                  <a:schemeClr val="tx1">
+                    <a:lumMod val="75000"/>
+                    <a:lumOff val="25000"/>
+                  </a:schemeClr>
+                </a:solidFill>
+                <a:latin typeface="+mn-lt"/>
+                <a:ea typeface="+mn-ea"/>
+                <a:cs typeface="+mn-cs"/>
+              </a:defRPr>
+            </a:lvl6pPr>
+            <a:lvl7pPr marL="1300000" indent="-228600" algn="l" defTabSz="914400" rtl="0" eaLnBrk="1" latinLnBrk="0" hangingPunct="1">
+              <a:lnSpc>
+                <a:spcPct val="90000"/>
+              </a:lnSpc>
+              <a:spcBef>
+                <a:spcPts val="200"/>
+              </a:spcBef>
+              <a:spcAft>
+                <a:spcPts val="400"/>
+              </a:spcAft>
+              <a:buClr>
+                <a:schemeClr val="accent1"/>
+              </a:buClr>
+              <a:buFont typeface="Calibri" pitchFamily="34" charset="0"/>
+              <a:buChar char="◦"/>
+              <a:defRPr sz="1400" kern="1200">
+                <a:solidFill>
+                  <a:schemeClr val="tx1">
+                    <a:lumMod val="75000"/>
+                    <a:lumOff val="25000"/>
+                  </a:schemeClr>
+                </a:solidFill>
+                <a:latin typeface="+mn-lt"/>
+                <a:ea typeface="+mn-ea"/>
+                <a:cs typeface="+mn-cs"/>
+              </a:defRPr>
+            </a:lvl7pPr>
+            <a:lvl8pPr marL="1500000" indent="-228600" algn="l" defTabSz="914400" rtl="0" eaLnBrk="1" latinLnBrk="0" hangingPunct="1">
+              <a:lnSpc>
+                <a:spcPct val="90000"/>
+              </a:lnSpc>
+              <a:spcBef>
+                <a:spcPts val="200"/>
+              </a:spcBef>
+              <a:spcAft>
+                <a:spcPts val="400"/>
+              </a:spcAft>
+              <a:buClr>
+                <a:schemeClr val="accent1"/>
+              </a:buClr>
+              <a:buFont typeface="Calibri" pitchFamily="34" charset="0"/>
+              <a:buChar char="◦"/>
+              <a:defRPr sz="1400" kern="1200">
+                <a:solidFill>
+                  <a:schemeClr val="tx1">
+                    <a:lumMod val="75000"/>
+                    <a:lumOff val="25000"/>
+                  </a:schemeClr>
+                </a:solidFill>
+                <a:latin typeface="+mn-lt"/>
+                <a:ea typeface="+mn-ea"/>
+                <a:cs typeface="+mn-cs"/>
+              </a:defRPr>
+            </a:lvl8pPr>
+            <a:lvl9pPr marL="1700000" indent="-228600" algn="l" defTabSz="914400" rtl="0" eaLnBrk="1" latinLnBrk="0" hangingPunct="1">
+              <a:lnSpc>
+                <a:spcPct val="90000"/>
+              </a:lnSpc>
+              <a:spcBef>
+                <a:spcPts val="200"/>
+              </a:spcBef>
+              <a:spcAft>
+                <a:spcPts val="400"/>
+              </a:spcAft>
+              <a:buClr>
+                <a:schemeClr val="accent1"/>
+              </a:buClr>
+              <a:buFont typeface="Calibri" pitchFamily="34" charset="0"/>
+              <a:buChar char="◦"/>
+              <a:defRPr sz="1400" kern="1200">
+                <a:solidFill>
+                  <a:schemeClr val="tx1">
+                    <a:lumMod val="75000"/>
+                    <a:lumOff val="25000"/>
+                  </a:schemeClr>
+                </a:solidFill>
+                <a:latin typeface="+mn-lt"/>
+                <a:ea typeface="+mn-ea"/>
+                <a:cs typeface="+mn-cs"/>
+              </a:defRPr>
+            </a:lvl9pPr>
+          </a:lstStyle>
+          <a:p>
+            <a:r>
+              <a:rPr lang="en-US" sz="3200" dirty="0"/>
+              <a:t>“Never attribute to malice that which can be adequately explained by stupidity, (</a:t>
+            </a:r>
+            <a:r>
+              <a:rPr lang="en-US" sz="3200" i="1" dirty="0"/>
+              <a:t>but don't rule out malice).”</a:t>
+            </a:r>
+            <a:endParaRPr lang="en-US" sz="3200" dirty="0"/>
+          </a:p>
+        </p:txBody>
+      </p:sp>
     </p:spTree>
     <p:extLst>
       <p:ext uri="{BB962C8B-B14F-4D97-AF65-F5344CB8AC3E}">
@@ -5056,6 +5478,458 @@
   <p:clrMapOvr>
     <a:masterClrMapping/>
   </p:clrMapOvr>
+  <p:timing>
+    <p:tnLst>
+      <p:par>
+        <p:cTn id="1" dur="indefinite" restart="never" nodeType="tmRoot">
+          <p:childTnLst>
+            <p:seq concurrent="1" nextAc="seek">
+              <p:cTn id="2" dur="indefinite" nodeType="mainSeq">
+                <p:childTnLst>
+                  <p:par>
+                    <p:cTn id="3" fill="hold">
+                      <p:stCondLst>
+                        <p:cond delay="indefinite"/>
+                      </p:stCondLst>
+                      <p:childTnLst>
+                        <p:par>
+                          <p:cTn id="4" fill="hold">
+                            <p:stCondLst>
+                              <p:cond delay="0"/>
+                            </p:stCondLst>
+                            <p:childTnLst>
+                              <p:par>
+                                <p:cTn id="5" presetID="10" presetClass="entr" presetSubtype="0" fill="hold" grpId="0" nodeType="clickEffect">
+                                  <p:stCondLst>
+                                    <p:cond delay="0"/>
+                                  </p:stCondLst>
+                                  <p:childTnLst>
+                                    <p:set>
+                                      <p:cBhvr>
+                                        <p:cTn id="6" dur="1" fill="hold">
+                                          <p:stCondLst>
+                                            <p:cond delay="0"/>
+                                          </p:stCondLst>
+                                        </p:cTn>
+                                        <p:tgtEl>
+                                          <p:spTgt spid="3"/>
+                                        </p:tgtEl>
+                                        <p:attrNameLst>
+                                          <p:attrName>style.visibility</p:attrName>
+                                        </p:attrNameLst>
+                                      </p:cBhvr>
+                                      <p:to>
+                                        <p:strVal val="visible"/>
+                                      </p:to>
+                                    </p:set>
+                                    <p:animEffect transition="in" filter="fade">
+                                      <p:cBhvr>
+                                        <p:cTn id="7" dur="500"/>
+                                        <p:tgtEl>
+                                          <p:spTgt spid="3"/>
+                                        </p:tgtEl>
+                                      </p:cBhvr>
+                                    </p:animEffect>
+                                  </p:childTnLst>
+                                </p:cTn>
+                              </p:par>
+                            </p:childTnLst>
+                          </p:cTn>
+                        </p:par>
+                      </p:childTnLst>
+                    </p:cTn>
+                  </p:par>
+                  <p:par>
+                    <p:cTn id="8" fill="hold">
+                      <p:stCondLst>
+                        <p:cond delay="indefinite"/>
+                      </p:stCondLst>
+                      <p:childTnLst>
+                        <p:par>
+                          <p:cTn id="9" fill="hold">
+                            <p:stCondLst>
+                              <p:cond delay="0"/>
+                            </p:stCondLst>
+                            <p:childTnLst>
+                              <p:par>
+                                <p:cTn id="10" presetID="10" presetClass="entr" presetSubtype="0" fill="hold" grpId="0" nodeType="clickEffect">
+                                  <p:stCondLst>
+                                    <p:cond delay="0"/>
+                                  </p:stCondLst>
+                                  <p:childTnLst>
+                                    <p:set>
+                                      <p:cBhvr>
+                                        <p:cTn id="11" dur="1" fill="hold">
+                                          <p:stCondLst>
+                                            <p:cond delay="0"/>
+                                          </p:stCondLst>
+                                        </p:cTn>
+                                        <p:tgtEl>
+                                          <p:spTgt spid="7"/>
+                                        </p:tgtEl>
+                                        <p:attrNameLst>
+                                          <p:attrName>style.visibility</p:attrName>
+                                        </p:attrNameLst>
+                                      </p:cBhvr>
+                                      <p:to>
+                                        <p:strVal val="visible"/>
+                                      </p:to>
+                                    </p:set>
+                                    <p:animEffect transition="in" filter="fade">
+                                      <p:cBhvr>
+                                        <p:cTn id="12" dur="500"/>
+                                        <p:tgtEl>
+                                          <p:spTgt spid="7"/>
+                                        </p:tgtEl>
+                                      </p:cBhvr>
+                                    </p:animEffect>
+                                  </p:childTnLst>
+                                </p:cTn>
+                              </p:par>
+                              <p:par>
+                                <p:cTn id="13" presetID="10" presetClass="exit" presetSubtype="0" fill="hold" grpId="0" nodeType="withEffect">
+                                  <p:stCondLst>
+                                    <p:cond delay="0"/>
+                                  </p:stCondLst>
+                                  <p:childTnLst>
+                                    <p:animEffect transition="out" filter="fade">
+                                      <p:cBhvr>
+                                        <p:cTn id="14" dur="250"/>
+                                        <p:tgtEl>
+                                          <p:spTgt spid="5">
+                                            <p:txEl>
+                                              <p:pRg st="0" end="0"/>
+                                            </p:txEl>
+                                          </p:spTgt>
+                                        </p:tgtEl>
+                                      </p:cBhvr>
+                                    </p:animEffect>
+                                    <p:set>
+                                      <p:cBhvr>
+                                        <p:cTn id="15" dur="1" fill="hold">
+                                          <p:stCondLst>
+                                            <p:cond delay="249"/>
+                                          </p:stCondLst>
+                                        </p:cTn>
+                                        <p:tgtEl>
+                                          <p:spTgt spid="5">
+                                            <p:txEl>
+                                              <p:pRg st="0" end="0"/>
+                                            </p:txEl>
+                                          </p:spTgt>
+                                        </p:tgtEl>
+                                        <p:attrNameLst>
+                                          <p:attrName>style.visibility</p:attrName>
+                                        </p:attrNameLst>
+                                      </p:cBhvr>
+                                      <p:to>
+                                        <p:strVal val="hidden"/>
+                                      </p:to>
+                                    </p:set>
+                                  </p:childTnLst>
+                                </p:cTn>
+                              </p:par>
+                            </p:childTnLst>
+                          </p:cTn>
+                        </p:par>
+                      </p:childTnLst>
+                    </p:cTn>
+                  </p:par>
+                </p:childTnLst>
+              </p:cTn>
+              <p:prevCondLst>
+                <p:cond evt="onPrev" delay="0">
+                  <p:tgtEl>
+                    <p:sldTgt/>
+                  </p:tgtEl>
+                </p:cond>
+              </p:prevCondLst>
+              <p:nextCondLst>
+                <p:cond evt="onNext" delay="0">
+                  <p:tgtEl>
+                    <p:sldTgt/>
+                  </p:tgtEl>
+                </p:cond>
+              </p:nextCondLst>
+            </p:seq>
+          </p:childTnLst>
+        </p:cTn>
+      </p:par>
+    </p:tnLst>
+    <p:bldLst>
+      <p:bldP spid="5" grpId="0" build="p"/>
+      <p:bldP spid="3" grpId="0"/>
+      <p:bldP spid="7" grpId="0"/>
+    </p:bldLst>
+  </p:timing>
+</p:sld>
+</file>
+
+<file path=ppt/slides/slide5.xml><?xml version="1.0" encoding="utf-8"?>
+<p:sld xmlns:a="http://schemas.openxmlformats.org/drawingml/2006/main" xmlns:r="http://schemas.openxmlformats.org/officeDocument/2006/relationships" xmlns:p="http://schemas.openxmlformats.org/presentationml/2006/main">
+  <p:cSld>
+    <p:spTree>
+      <p:nvGrpSpPr>
+        <p:cNvPr id="1" name=""/>
+        <p:cNvGrpSpPr/>
+        <p:nvPr/>
+      </p:nvGrpSpPr>
+      <p:grpSpPr>
+        <a:xfrm>
+          <a:off x="0" y="0"/>
+          <a:ext cx="0" cy="0"/>
+          <a:chOff x="0" y="0"/>
+          <a:chExt cx="0" cy="0"/>
+        </a:xfrm>
+      </p:grpSpPr>
+      <p:sp>
+        <p:nvSpPr>
+          <p:cNvPr id="2" name="Cím 1">
+            <a:extLst>
+              <a:ext uri="{FF2B5EF4-FFF2-40B4-BE49-F238E27FC236}">
+                <a16:creationId xmlns:a16="http://schemas.microsoft.com/office/drawing/2014/main" id="{E5A24DA7-99D0-4B1C-8657-CEA9F3F30441}"/>
+              </a:ext>
+            </a:extLst>
+          </p:cNvPr>
+          <p:cNvSpPr>
+            <a:spLocks noGrp="1"/>
+          </p:cNvSpPr>
+          <p:nvPr>
+            <p:ph type="title"/>
+          </p:nvPr>
+        </p:nvSpPr>
+        <p:spPr/>
+        <p:txBody>
+          <a:bodyPr/>
+          <a:lstStyle/>
+          <a:p>
+            <a:r>
+              <a:rPr lang="en-US" dirty="0" err="1"/>
+              <a:t>Eagleson's</a:t>
+            </a:r>
+            <a:r>
+              <a:rPr lang="en-US" dirty="0"/>
+              <a:t> Law</a:t>
+            </a:r>
+            <a:endParaRPr lang="en-GB" dirty="0"/>
+          </a:p>
+        </p:txBody>
+      </p:sp>
+      <p:sp>
+        <p:nvSpPr>
+          <p:cNvPr id="4" name="Élőláb helye 3">
+            <a:extLst>
+              <a:ext uri="{FF2B5EF4-FFF2-40B4-BE49-F238E27FC236}">
+                <a16:creationId xmlns:a16="http://schemas.microsoft.com/office/drawing/2014/main" id="{1EBB77C6-A1D5-495A-A32E-6F0803AB59C7}"/>
+              </a:ext>
+            </a:extLst>
+          </p:cNvPr>
+          <p:cNvSpPr>
+            <a:spLocks noGrp="1"/>
+          </p:cNvSpPr>
+          <p:nvPr>
+            <p:ph type="ftr" sz="quarter" idx="11"/>
+          </p:nvPr>
+        </p:nvSpPr>
+        <p:spPr/>
+        <p:txBody>
+          <a:bodyPr/>
+          <a:lstStyle/>
+          <a:p>
+            <a:r>
+              <a:rPr lang="nb-NO"/>
+              <a:t>Lightning talk - Arnold BARNA - 2017-10-18</a:t>
+            </a:r>
+            <a:endParaRPr lang="en-GB"/>
+          </a:p>
+        </p:txBody>
+      </p:sp>
+      <p:sp>
+        <p:nvSpPr>
+          <p:cNvPr id="5" name="Tartalom helye 4">
+            <a:extLst>
+              <a:ext uri="{FF2B5EF4-FFF2-40B4-BE49-F238E27FC236}">
+                <a16:creationId xmlns:a16="http://schemas.microsoft.com/office/drawing/2014/main" id="{24E2D956-65F1-47CB-B69C-A6F002A1B1FB}"/>
+              </a:ext>
+            </a:extLst>
+          </p:cNvPr>
+          <p:cNvSpPr>
+            <a:spLocks noGrp="1"/>
+          </p:cNvSpPr>
+          <p:nvPr>
+            <p:ph idx="1"/>
+          </p:nvPr>
+        </p:nvSpPr>
+        <p:spPr>
+          <a:xfrm>
+            <a:off x="1097280" y="1845734"/>
+            <a:ext cx="10058400" cy="1742418"/>
+          </a:xfrm>
+        </p:spPr>
+        <p:txBody>
+          <a:bodyPr>
+            <a:normAutofit/>
+          </a:bodyPr>
+          <a:lstStyle/>
+          <a:p>
+            <a:r>
+              <a:rPr lang="en-US" sz="3200" dirty="0"/>
+              <a:t>"Any code of your own that you haven't looked at for </a:t>
+            </a:r>
+            <a:r>
+              <a:rPr lang="en-US" sz="3200" b="1" dirty="0"/>
+              <a:t>six or more months </a:t>
+            </a:r>
+            <a:r>
+              <a:rPr lang="en-US" sz="3200" dirty="0"/>
+              <a:t>might as well have been written by someone else.“</a:t>
+            </a:r>
+          </a:p>
+          <a:p>
+            <a:endParaRPr lang="en-US" sz="3200" i="1" dirty="0"/>
+          </a:p>
+        </p:txBody>
+      </p:sp>
+      <p:sp>
+        <p:nvSpPr>
+          <p:cNvPr id="3" name="Szövegdoboz 2">
+            <a:extLst>
+              <a:ext uri="{FF2B5EF4-FFF2-40B4-BE49-F238E27FC236}">
+                <a16:creationId xmlns:a16="http://schemas.microsoft.com/office/drawing/2014/main" id="{4DEC7B37-716B-4017-B088-F1ABEBF18264}"/>
+              </a:ext>
+            </a:extLst>
+          </p:cNvPr>
+          <p:cNvSpPr txBox="1"/>
+          <p:nvPr/>
+        </p:nvSpPr>
+        <p:spPr>
+          <a:xfrm>
+            <a:off x="1097280" y="3696526"/>
+            <a:ext cx="7849950" cy="1077218"/>
+          </a:xfrm>
+          <a:prstGeom prst="rect">
+            <a:avLst/>
+          </a:prstGeom>
+          <a:noFill/>
+        </p:spPr>
+        <p:txBody>
+          <a:bodyPr wrap="square" rtlCol="0">
+            <a:spAutoFit/>
+          </a:bodyPr>
+          <a:lstStyle/>
+          <a:p>
+            <a:r>
+              <a:rPr lang="en-US" sz="3200" dirty="0"/>
+              <a:t>In other words: Clean code helps </a:t>
+            </a:r>
+            <a:r>
+              <a:rPr lang="en-US" sz="3200" b="1" dirty="0"/>
+              <a:t>you</a:t>
+            </a:r>
+            <a:r>
+              <a:rPr lang="en-US" sz="3200" dirty="0"/>
+              <a:t> as well, not only the others.</a:t>
+            </a:r>
+            <a:endParaRPr lang="en-GB" sz="3200" i="1" dirty="0"/>
+          </a:p>
+        </p:txBody>
+      </p:sp>
+    </p:spTree>
+    <p:extLst>
+      <p:ext uri="{BB962C8B-B14F-4D97-AF65-F5344CB8AC3E}">
+        <p14:creationId xmlns:p14="http://schemas.microsoft.com/office/powerpoint/2010/main" val="3220929704"/>
+      </p:ext>
+    </p:extLst>
+  </p:cSld>
+  <p:clrMapOvr>
+    <a:masterClrMapping/>
+  </p:clrMapOvr>
+  <p:timing>
+    <p:tnLst>
+      <p:par>
+        <p:cTn id="1" dur="indefinite" restart="never" nodeType="tmRoot">
+          <p:childTnLst>
+            <p:seq concurrent="1" nextAc="seek">
+              <p:cTn id="2" dur="indefinite" nodeType="mainSeq">
+                <p:childTnLst>
+                  <p:par>
+                    <p:cTn id="3" fill="hold">
+                      <p:stCondLst>
+                        <p:cond delay="indefinite"/>
+                      </p:stCondLst>
+                      <p:childTnLst>
+                        <p:par>
+                          <p:cTn id="4" fill="hold">
+                            <p:stCondLst>
+                              <p:cond delay="0"/>
+                            </p:stCondLst>
+                            <p:childTnLst>
+                              <p:par>
+                                <p:cTn id="5" presetID="10" presetClass="entr" presetSubtype="0" fill="hold" grpId="0" nodeType="clickEffect">
+                                  <p:stCondLst>
+                                    <p:cond delay="0"/>
+                                  </p:stCondLst>
+                                  <p:childTnLst>
+                                    <p:set>
+                                      <p:cBhvr>
+                                        <p:cTn id="6" dur="1" fill="hold">
+                                          <p:stCondLst>
+                                            <p:cond delay="0"/>
+                                          </p:stCondLst>
+                                        </p:cTn>
+                                        <p:tgtEl>
+                                          <p:spTgt spid="3"/>
+                                        </p:tgtEl>
+                                        <p:attrNameLst>
+                                          <p:attrName>style.visibility</p:attrName>
+                                        </p:attrNameLst>
+                                      </p:cBhvr>
+                                      <p:to>
+                                        <p:strVal val="visible"/>
+                                      </p:to>
+                                    </p:set>
+                                    <p:animEffect transition="in" filter="fade">
+                                      <p:cBhvr>
+                                        <p:cTn id="7" dur="500"/>
+                                        <p:tgtEl>
+                                          <p:spTgt spid="3"/>
+                                        </p:tgtEl>
+                                      </p:cBhvr>
+                                    </p:animEffect>
+                                  </p:childTnLst>
+                                </p:cTn>
+                              </p:par>
+                            </p:childTnLst>
+                          </p:cTn>
+                        </p:par>
+                      </p:childTnLst>
+                    </p:cTn>
+                  </p:par>
+                </p:childTnLst>
+              </p:cTn>
+              <p:prevCondLst>
+                <p:cond evt="onPrev" delay="0">
+                  <p:tgtEl>
+                    <p:sldTgt/>
+                  </p:tgtEl>
+                </p:cond>
+              </p:prevCondLst>
+              <p:nextCondLst>
+                <p:cond evt="onNext" delay="0">
+                  <p:tgtEl>
+                    <p:sldTgt/>
+                  </p:tgtEl>
+                </p:cond>
+              </p:nextCondLst>
+            </p:seq>
+          </p:childTnLst>
+        </p:cTn>
+      </p:par>
+    </p:tnLst>
+    <p:bldLst>
+      <p:bldP spid="3" grpId="0"/>
+    </p:bldLst>
+  </p:timing>
 </p:sld>
 </file>
 
@@ -5103,7 +5977,11 @@
             </a:r>
             <a:r>
               <a:rPr lang="en-US" dirty="0"/>
-              <a:t> Law</a:t>
+              <a:t> Law </a:t>
+            </a:r>
+            <a:r>
+              <a:rPr lang="en-US" sz="3200" dirty="0"/>
+              <a:t>(cont’d)</a:t>
             </a:r>
             <a:endParaRPr lang="en-GB" dirty="0"/>
           </a:p>
@@ -5132,7 +6010,7 @@
           <a:p>
             <a:r>
               <a:rPr lang="nb-NO"/>
-              <a:t>Lightning talk - Arnold BARNA - 2017-10-15</a:t>
+              <a:t>Lightning talk - Arnold BARNA - 2017-10-18</a:t>
             </a:r>
             <a:endParaRPr lang="en-GB"/>
           </a:p>
@@ -5154,29 +6032,188 @@
             <p:ph idx="1"/>
           </p:nvPr>
         </p:nvSpPr>
-        <p:spPr/>
-        <p:txBody>
-          <a:bodyPr/>
-          <a:lstStyle/>
-          <a:p>
-            <a:r>
-              <a:rPr lang="en-US" dirty="0"/>
-              <a:t>"Any code of your own that you haven't looked at for six or more months might as well have been written by someone else."</a:t>
-            </a:r>
-            <a:endParaRPr lang="en-GB" i="1" dirty="0"/>
+        <p:spPr>
+          <a:xfrm>
+            <a:off x="1097280" y="1845734"/>
+            <a:ext cx="10058400" cy="1128960"/>
+          </a:xfrm>
+        </p:spPr>
+        <p:txBody>
+          <a:bodyPr>
+            <a:normAutofit/>
+          </a:bodyPr>
+          <a:lstStyle/>
+          <a:p>
+            <a:r>
+              <a:rPr lang="en-US" sz="3200" dirty="0"/>
+              <a:t>“</a:t>
+            </a:r>
+            <a:r>
+              <a:rPr lang="en-US" sz="3200" dirty="0" err="1"/>
+              <a:t>Eagleson</a:t>
+            </a:r>
+            <a:r>
+              <a:rPr lang="en-US" sz="3200" dirty="0"/>
+              <a:t> is an optimist; the real number is more like </a:t>
+            </a:r>
+            <a:r>
+              <a:rPr lang="en-US" sz="3200" b="1" dirty="0"/>
+              <a:t>3 weeks</a:t>
+            </a:r>
+            <a:r>
+              <a:rPr lang="en-US" sz="3200" dirty="0"/>
+              <a:t>.”</a:t>
+            </a:r>
+            <a:endParaRPr lang="en-US" sz="3200" i="1" dirty="0"/>
+          </a:p>
+        </p:txBody>
+      </p:sp>
+      <p:sp>
+        <p:nvSpPr>
+          <p:cNvPr id="3" name="Szövegdoboz 2">
+            <a:extLst>
+              <a:ext uri="{FF2B5EF4-FFF2-40B4-BE49-F238E27FC236}">
+                <a16:creationId xmlns:a16="http://schemas.microsoft.com/office/drawing/2014/main" id="{1ED70ACE-04A4-4FB4-B091-A99C4CFE40E6}"/>
+              </a:ext>
+            </a:extLst>
+          </p:cNvPr>
+          <p:cNvSpPr txBox="1"/>
+          <p:nvPr/>
+        </p:nvSpPr>
+        <p:spPr>
+          <a:xfrm>
+            <a:off x="1097280" y="3402957"/>
+            <a:ext cx="8660178" cy="1077218"/>
+          </a:xfrm>
+          <a:prstGeom prst="rect">
+            <a:avLst/>
+          </a:prstGeom>
+          <a:noFill/>
+        </p:spPr>
+        <p:txBody>
+          <a:bodyPr wrap="square" rtlCol="0">
+            <a:spAutoFit/>
+          </a:bodyPr>
+          <a:lstStyle/>
+          <a:p>
+            <a:r>
+              <a:rPr lang="en-US" sz="3200" dirty="0"/>
+              <a:t>In other words: Clean code helps </a:t>
+            </a:r>
+            <a:r>
+              <a:rPr lang="en-US" sz="3200" b="1" dirty="0"/>
+              <a:t>you a lot</a:t>
+            </a:r>
+            <a:r>
+              <a:rPr lang="en-US" sz="3200" dirty="0"/>
+              <a:t>, </a:t>
+            </a:r>
+          </a:p>
+          <a:p>
+            <a:r>
+              <a:rPr lang="en-US" sz="3200" dirty="0"/>
+              <a:t>and maybe sometimes the others.</a:t>
+            </a:r>
+            <a:endParaRPr lang="en-GB" sz="3200" i="1" dirty="0"/>
           </a:p>
         </p:txBody>
       </p:sp>
     </p:spTree>
     <p:extLst>
       <p:ext uri="{BB962C8B-B14F-4D97-AF65-F5344CB8AC3E}">
-        <p14:creationId xmlns:p14="http://schemas.microsoft.com/office/powerpoint/2010/main" val="3220929704"/>
+        <p14:creationId xmlns:p14="http://schemas.microsoft.com/office/powerpoint/2010/main" val="2057003155"/>
       </p:ext>
     </p:extLst>
   </p:cSld>
   <p:clrMapOvr>
     <a:masterClrMapping/>
   </p:clrMapOvr>
+  <p:timing>
+    <p:tnLst>
+      <p:par>
+        <p:cTn id="1" dur="indefinite" restart="never" nodeType="tmRoot">
+          <p:childTnLst>
+            <p:seq concurrent="1" nextAc="seek">
+              <p:cTn id="2" dur="indefinite" nodeType="mainSeq">
+                <p:childTnLst>
+                  <p:par>
+                    <p:cTn id="3" fill="hold">
+                      <p:stCondLst>
+                        <p:cond delay="indefinite"/>
+                      </p:stCondLst>
+                      <p:childTnLst>
+                        <p:par>
+                          <p:cTn id="4" fill="hold">
+                            <p:stCondLst>
+                              <p:cond delay="0"/>
+                            </p:stCondLst>
+                            <p:childTnLst>
+                              <p:par>
+                                <p:cTn id="5" presetID="10" presetClass="entr" presetSubtype="0" fill="hold" grpId="0" nodeType="clickEffect">
+                                  <p:stCondLst>
+                                    <p:cond delay="0"/>
+                                  </p:stCondLst>
+                                  <p:childTnLst>
+                                    <p:set>
+                                      <p:cBhvr>
+                                        <p:cTn id="6" dur="1" fill="hold">
+                                          <p:stCondLst>
+                                            <p:cond delay="0"/>
+                                          </p:stCondLst>
+                                        </p:cTn>
+                                        <p:tgtEl>
+                                          <p:spTgt spid="3"/>
+                                        </p:tgtEl>
+                                        <p:attrNameLst>
+                                          <p:attrName>style.visibility</p:attrName>
+                                        </p:attrNameLst>
+                                      </p:cBhvr>
+                                      <p:to>
+                                        <p:strVal val="visible"/>
+                                      </p:to>
+                                    </p:set>
+                                    <p:animEffect transition="in" filter="fade">
+                                      <p:cBhvr>
+                                        <p:cTn id="7" dur="500"/>
+                                        <p:tgtEl>
+                                          <p:spTgt spid="3"/>
+                                        </p:tgtEl>
+                                      </p:cBhvr>
+                                    </p:animEffect>
+                                  </p:childTnLst>
+                                </p:cTn>
+                              </p:par>
+                            </p:childTnLst>
+                          </p:cTn>
+                        </p:par>
+                      </p:childTnLst>
+                    </p:cTn>
+                  </p:par>
+                </p:childTnLst>
+              </p:cTn>
+              <p:prevCondLst>
+                <p:cond evt="onPrev" delay="0">
+                  <p:tgtEl>
+                    <p:sldTgt/>
+                  </p:tgtEl>
+                </p:cond>
+              </p:prevCondLst>
+              <p:nextCondLst>
+                <p:cond evt="onNext" delay="0">
+                  <p:tgtEl>
+                    <p:sldTgt/>
+                  </p:tgtEl>
+                </p:cond>
+              </p:nextCondLst>
+            </p:seq>
+          </p:childTnLst>
+        </p:cTn>
+      </p:par>
+    </p:tnLst>
+    <p:bldLst>
+      <p:bldP spid="3" grpId="0"/>
+    </p:bldLst>
+  </p:timing>
 </p:sld>
 </file>
 
@@ -5220,7 +6257,11 @@
           <a:p>
             <a:r>
               <a:rPr lang="en-US" dirty="0"/>
-              <a:t>Hofstadter's Law</a:t>
+              <a:t>Hofstadter's Law </a:t>
+            </a:r>
+            <a:r>
+              <a:rPr lang="en-US" sz="3200" dirty="0"/>
+              <a:t>(Professor  @Stanford)</a:t>
             </a:r>
             <a:endParaRPr lang="en-GB" dirty="0"/>
           </a:p>
@@ -5249,7 +6290,7 @@
           <a:p>
             <a:r>
               <a:rPr lang="nb-NO"/>
-              <a:t>Lightning talk - Arnold BARNA - 2017-10-15</a:t>
+              <a:t>Lightning talk - Arnold BARNA - 2017-10-18</a:t>
             </a:r>
             <a:endParaRPr lang="en-GB"/>
           </a:p>
@@ -5271,23 +6312,66 @@
             <p:ph idx="1"/>
           </p:nvPr>
         </p:nvSpPr>
-        <p:spPr/>
-        <p:txBody>
-          <a:bodyPr/>
-          <a:lstStyle/>
-          <a:p>
-            <a:r>
-              <a:rPr lang="en-US" dirty="0"/>
+        <p:spPr>
+          <a:xfrm>
+            <a:off x="1097280" y="1845734"/>
+            <a:ext cx="5471471" cy="4023360"/>
+          </a:xfrm>
+        </p:spPr>
+        <p:txBody>
+          <a:bodyPr>
+            <a:normAutofit/>
+          </a:bodyPr>
+          <a:lstStyle/>
+          <a:p>
+            <a:r>
+              <a:rPr lang="en-US" sz="3200" dirty="0"/>
               <a:t>"It always takes longer than you expect, </a:t>
             </a:r>
             <a:r>
-              <a:rPr lang="en-US" i="1" dirty="0"/>
+              <a:rPr lang="en-US" sz="3200" i="1" dirty="0"/>
               <a:t>even when you take into account Hofstadter's Law."</a:t>
             </a:r>
-            <a:endParaRPr lang="en-GB" i="1" dirty="0"/>
-          </a:p>
-        </p:txBody>
-      </p:sp>
+            <a:endParaRPr lang="en-GB" sz="3200" i="1" dirty="0"/>
+          </a:p>
+        </p:txBody>
+      </p:sp>
+      <p:pic>
+        <p:nvPicPr>
+          <p:cNvPr id="6" name="Kép 5">
+            <a:extLst>
+              <a:ext uri="{FF2B5EF4-FFF2-40B4-BE49-F238E27FC236}">
+                <a16:creationId xmlns:a16="http://schemas.microsoft.com/office/drawing/2014/main" id="{3A1EB088-5661-4916-9865-576E5B5DA2E5}"/>
+              </a:ext>
+            </a:extLst>
+          </p:cNvPr>
+          <p:cNvPicPr>
+            <a:picLocks noChangeAspect="1"/>
+          </p:cNvPicPr>
+          <p:nvPr/>
+        </p:nvPicPr>
+        <p:blipFill>
+          <a:blip r:embed="rId2">
+            <a:extLst>
+              <a:ext uri="{28A0092B-C50C-407E-A947-70E740481C1C}">
+                <a14:useLocalDpi xmlns:a14="http://schemas.microsoft.com/office/drawing/2010/main" val="0"/>
+              </a:ext>
+            </a:extLst>
+          </a:blip>
+          <a:stretch>
+            <a:fillRect/>
+          </a:stretch>
+        </p:blipFill>
+        <p:spPr>
+          <a:xfrm>
+            <a:off x="8012430" y="1845734"/>
+            <a:ext cx="3143250" cy="3895725"/>
+          </a:xfrm>
+          <a:prstGeom prst="rect">
+            <a:avLst/>
+          </a:prstGeom>
+        </p:spPr>
+      </p:pic>
     </p:spTree>
     <p:extLst>
       <p:ext uri="{BB962C8B-B14F-4D97-AF65-F5344CB8AC3E}">
@@ -5341,7 +6425,11 @@
           <a:p>
             <a:r>
               <a:rPr lang="en-US" dirty="0"/>
-              <a:t>The 90-90 Rule (Tom Cargill)</a:t>
+              <a:t>The 90-90 Rule </a:t>
+            </a:r>
+            <a:r>
+              <a:rPr lang="en-US" sz="3200" dirty="0"/>
+              <a:t>(Tom Cargill @Bell Labs)</a:t>
             </a:r>
             <a:endParaRPr lang="en-GB" dirty="0"/>
           </a:p>
@@ -5370,7 +6458,7 @@
           <a:p>
             <a:r>
               <a:rPr lang="nb-NO"/>
-              <a:t>Lightning talk - Arnold BARNA - 2017-10-15</a:t>
+              <a:t>Lightning talk - Arnold BARNA - 2017-10-18</a:t>
             </a:r>
             <a:endParaRPr lang="en-GB"/>
           </a:p>
@@ -5392,46 +6480,126 @@
             <p:ph idx="1"/>
           </p:nvPr>
         </p:nvSpPr>
-        <p:spPr/>
-        <p:txBody>
-          <a:bodyPr/>
-          <a:lstStyle/>
-          <a:p>
-            <a:r>
-              <a:rPr lang="en-US" dirty="0"/>
+        <p:spPr>
+          <a:xfrm>
+            <a:off x="1097280" y="1845734"/>
+            <a:ext cx="10058400" cy="1233132"/>
+          </a:xfrm>
+        </p:spPr>
+        <p:txBody>
+          <a:bodyPr>
+            <a:normAutofit/>
+          </a:bodyPr>
+          <a:lstStyle/>
+          <a:p>
+            <a:r>
+              <a:rPr lang="en-US" sz="3200" dirty="0"/>
               <a:t>“The </a:t>
             </a:r>
             <a:r>
-              <a:rPr lang="en-US" b="1" dirty="0"/>
+              <a:rPr lang="en-US" sz="3200" b="1" dirty="0"/>
               <a:t>first 90 percent </a:t>
             </a:r>
             <a:r>
-              <a:rPr lang="en-US" dirty="0"/>
-              <a:t>of the code accounts for the first 90 percent of the development time. </a:t>
-            </a:r>
-          </a:p>
-          <a:p>
-            <a:r>
-              <a:rPr lang="en-US" dirty="0"/>
+              <a:rPr lang="en-US" sz="3200" dirty="0"/>
+              <a:t>of the code accounts for the first 90 percent of the development time.</a:t>
+            </a:r>
+          </a:p>
+        </p:txBody>
+      </p:sp>
+      <p:sp>
+        <p:nvSpPr>
+          <p:cNvPr id="3" name="Szövegdoboz 2">
+            <a:extLst>
+              <a:ext uri="{FF2B5EF4-FFF2-40B4-BE49-F238E27FC236}">
+                <a16:creationId xmlns:a16="http://schemas.microsoft.com/office/drawing/2014/main" id="{6D3CFFB8-1CD7-4F1F-9E62-89DB49C130C5}"/>
+              </a:ext>
+            </a:extLst>
+          </p:cNvPr>
+          <p:cNvSpPr txBox="1"/>
+          <p:nvPr/>
+        </p:nvSpPr>
+        <p:spPr>
+          <a:xfrm>
+            <a:off x="1097280" y="3078866"/>
+            <a:ext cx="10058400" cy="1077218"/>
+          </a:xfrm>
+          <a:prstGeom prst="rect">
+            <a:avLst/>
+          </a:prstGeom>
+          <a:noFill/>
+        </p:spPr>
+        <p:txBody>
+          <a:bodyPr wrap="square" rtlCol="0">
+            <a:spAutoFit/>
+          </a:bodyPr>
+          <a:lstStyle/>
+          <a:p>
+            <a:r>
+              <a:rPr lang="en-US" sz="3200" dirty="0"/>
               <a:t>The </a:t>
             </a:r>
             <a:r>
-              <a:rPr lang="en-US" b="1" dirty="0"/>
+              <a:rPr lang="en-US" sz="3200" b="1" dirty="0"/>
               <a:t>remaining 10 percent </a:t>
             </a:r>
             <a:r>
-              <a:rPr lang="en-US" dirty="0"/>
+              <a:rPr lang="en-US" sz="3200" dirty="0"/>
               <a:t>of the code accounts for the </a:t>
             </a:r>
             <a:r>
-              <a:rPr lang="en-US" b="1" dirty="0"/>
+              <a:rPr lang="en-US" sz="3200" b="1" dirty="0"/>
               <a:t>other 90 percent </a:t>
             </a:r>
             <a:r>
-              <a:rPr lang="en-US" dirty="0"/>
+              <a:rPr lang="en-US" sz="3200" dirty="0"/>
               <a:t>of the development time.”</a:t>
             </a:r>
-            <a:endParaRPr lang="en-GB" i="1" dirty="0"/>
+            <a:endParaRPr lang="en-GB" sz="3200" i="1" dirty="0"/>
+          </a:p>
+        </p:txBody>
+      </p:sp>
+      <p:sp>
+        <p:nvSpPr>
+          <p:cNvPr id="6" name="Szövegdoboz 5">
+            <a:extLst>
+              <a:ext uri="{FF2B5EF4-FFF2-40B4-BE49-F238E27FC236}">
+                <a16:creationId xmlns:a16="http://schemas.microsoft.com/office/drawing/2014/main" id="{CB311857-985B-40F0-9EBF-23B9D1AD55F6}"/>
+              </a:ext>
+            </a:extLst>
+          </p:cNvPr>
+          <p:cNvSpPr txBox="1"/>
+          <p:nvPr/>
+        </p:nvSpPr>
+        <p:spPr>
+          <a:xfrm>
+            <a:off x="1097280" y="4311998"/>
+            <a:ext cx="10058400" cy="1077218"/>
+          </a:xfrm>
+          <a:prstGeom prst="rect">
+            <a:avLst/>
+          </a:prstGeom>
+          <a:noFill/>
+        </p:spPr>
+        <p:txBody>
+          <a:bodyPr wrap="square" rtlCol="0">
+            <a:spAutoFit/>
+          </a:bodyPr>
+          <a:lstStyle/>
+          <a:p>
+            <a:r>
+              <a:rPr lang="en-US" sz="3200" dirty="0"/>
+              <a:t>In other words: If you think you’re almost ready, you’re </a:t>
+            </a:r>
+            <a:r>
+              <a:rPr lang="en-US" sz="3200" b="1" dirty="0"/>
+              <a:t>only halfway done</a:t>
+            </a:r>
+            <a:r>
+              <a:rPr lang="en-US" sz="3200" dirty="0"/>
+              <a:t>.</a:t>
+            </a:r>
+            <a:endParaRPr lang="en-GB" sz="3200" i="1" dirty="0"/>
           </a:p>
         </p:txBody>
       </p:sp>
@@ -5445,6 +6613,146 @@
   <p:clrMapOvr>
     <a:masterClrMapping/>
   </p:clrMapOvr>
+  <p:timing>
+    <p:tnLst>
+      <p:par>
+        <p:cTn id="1" dur="indefinite" restart="never" nodeType="tmRoot">
+          <p:childTnLst>
+            <p:seq concurrent="1" nextAc="seek">
+              <p:cTn id="2" dur="indefinite" nodeType="mainSeq">
+                <p:childTnLst>
+                  <p:par>
+                    <p:cTn id="3" fill="hold">
+                      <p:stCondLst>
+                        <p:cond delay="indefinite"/>
+                      </p:stCondLst>
+                      <p:childTnLst>
+                        <p:par>
+                          <p:cTn id="4" fill="hold">
+                            <p:stCondLst>
+                              <p:cond delay="0"/>
+                            </p:stCondLst>
+                            <p:childTnLst>
+                              <p:par>
+                                <p:cTn id="5" presetID="10" presetClass="entr" presetSubtype="0" fill="hold" grpId="0" nodeType="clickEffect">
+                                  <p:stCondLst>
+                                    <p:cond delay="0"/>
+                                  </p:stCondLst>
+                                  <p:childTnLst>
+                                    <p:set>
+                                      <p:cBhvr>
+                                        <p:cTn id="6" dur="1" fill="hold">
+                                          <p:stCondLst>
+                                            <p:cond delay="0"/>
+                                          </p:stCondLst>
+                                        </p:cTn>
+                                        <p:tgtEl>
+                                          <p:spTgt spid="3"/>
+                                        </p:tgtEl>
+                                        <p:attrNameLst>
+                                          <p:attrName>style.visibility</p:attrName>
+                                        </p:attrNameLst>
+                                      </p:cBhvr>
+                                      <p:to>
+                                        <p:strVal val="visible"/>
+                                      </p:to>
+                                    </p:set>
+                                    <p:animEffect transition="in" filter="fade">
+                                      <p:cBhvr>
+                                        <p:cTn id="7" dur="500"/>
+                                        <p:tgtEl>
+                                          <p:spTgt spid="3"/>
+                                        </p:tgtEl>
+                                      </p:cBhvr>
+                                    </p:animEffect>
+                                  </p:childTnLst>
+                                </p:cTn>
+                              </p:par>
+                            </p:childTnLst>
+                          </p:cTn>
+                        </p:par>
+                      </p:childTnLst>
+                    </p:cTn>
+                  </p:par>
+                  <p:par>
+                    <p:cTn id="8" fill="hold">
+                      <p:stCondLst>
+                        <p:cond delay="indefinite"/>
+                      </p:stCondLst>
+                      <p:childTnLst>
+                        <p:par>
+                          <p:cTn id="9" fill="hold">
+                            <p:stCondLst>
+                              <p:cond delay="0"/>
+                            </p:stCondLst>
+                            <p:childTnLst>
+                              <p:par>
+                                <p:cTn id="10" presetID="10" presetClass="entr" presetSubtype="0" fill="hold" grpId="0" nodeType="clickEffect">
+                                  <p:stCondLst>
+                                    <p:cond delay="0"/>
+                                  </p:stCondLst>
+                                  <p:childTnLst>
+                                    <p:set>
+                                      <p:cBhvr>
+                                        <p:cTn id="11" dur="1" fill="hold">
+                                          <p:stCondLst>
+                                            <p:cond delay="0"/>
+                                          </p:stCondLst>
+                                        </p:cTn>
+                                        <p:tgtEl>
+                                          <p:spTgt spid="6"/>
+                                        </p:tgtEl>
+                                        <p:attrNameLst>
+                                          <p:attrName>style.visibility</p:attrName>
+                                        </p:attrNameLst>
+                                      </p:cBhvr>
+                                      <p:to>
+                                        <p:strVal val="visible"/>
+                                      </p:to>
+                                    </p:set>
+                                    <p:animEffect transition="in" filter="fade">
+                                      <p:cBhvr>
+                                        <p:cTn id="12" dur="500"/>
+                                        <p:tgtEl>
+                                          <p:spTgt spid="6"/>
+                                        </p:tgtEl>
+                                      </p:cBhvr>
+                                    </p:animEffect>
+                                  </p:childTnLst>
+                                </p:cTn>
+                              </p:par>
+                            </p:childTnLst>
+                          </p:cTn>
+                        </p:par>
+                      </p:childTnLst>
+                    </p:cTn>
+                  </p:par>
+                </p:childTnLst>
+              </p:cTn>
+              <p:prevCondLst>
+                <p:cond evt="onPrev" delay="0">
+                  <p:tgtEl>
+                    <p:sldTgt/>
+                  </p:tgtEl>
+                </p:cond>
+              </p:prevCondLst>
+              <p:nextCondLst>
+                <p:cond evt="onNext" delay="0">
+                  <p:tgtEl>
+                    <p:sldTgt/>
+                  </p:tgtEl>
+                </p:cond>
+              </p:nextCondLst>
+            </p:seq>
+          </p:childTnLst>
+        </p:cTn>
+      </p:par>
+    </p:tnLst>
+    <p:bldLst>
+      <p:bldP spid="3" grpId="0"/>
+      <p:bldP spid="6" grpId="0"/>
+    </p:bldLst>
+  </p:timing>
 </p:sld>
 </file>
 
@@ -5470,7 +6778,7 @@
           <p:cNvPr id="2" name="Cím 1">
             <a:extLst>
               <a:ext uri="{FF2B5EF4-FFF2-40B4-BE49-F238E27FC236}">
-                <a16:creationId xmlns:a16="http://schemas.microsoft.com/office/drawing/2014/main" id="{0525D335-DEE6-431F-9D28-6D74ED158BF7}"/>
+                <a16:creationId xmlns:a16="http://schemas.microsoft.com/office/drawing/2014/main" id="{E5A24DA7-99D0-4B1C-8657-CEA9F3F30441}"/>
               </a:ext>
             </a:extLst>
           </p:cNvPr>
@@ -5488,7 +6796,19 @@
           <a:p>
             <a:r>
               <a:rPr lang="en-US" dirty="0"/>
-              <a:t>Thank you for the attention</a:t>
+              <a:t>Parkinson's Law </a:t>
+            </a:r>
+            <a:r>
+              <a:rPr lang="en-US" sz="3200" dirty="0"/>
+              <a:t>(</a:t>
+            </a:r>
+            <a:r>
+              <a:rPr lang="en-GB" sz="3200" dirty="0"/>
+              <a:t>British naval historian</a:t>
+            </a:r>
+            <a:r>
+              <a:rPr lang="en-US" sz="3200" dirty="0"/>
+              <a:t>)</a:t>
             </a:r>
             <a:endParaRPr lang="en-GB" dirty="0"/>
           </a:p>
@@ -5496,10 +6816,10 @@
       </p:sp>
       <p:sp>
         <p:nvSpPr>
-          <p:cNvPr id="3" name="Tartalom helye 2">
+          <p:cNvPr id="4" name="Élőláb helye 3">
             <a:extLst>
               <a:ext uri="{FF2B5EF4-FFF2-40B4-BE49-F238E27FC236}">
-                <a16:creationId xmlns:a16="http://schemas.microsoft.com/office/drawing/2014/main" id="{84B4C02B-37FC-4670-A393-9F8D1E45892E}"/>
+                <a16:creationId xmlns:a16="http://schemas.microsoft.com/office/drawing/2014/main" id="{1EBB77C6-A1D5-495A-A32E-6F0803AB59C7}"/>
               </a:ext>
             </a:extLst>
           </p:cNvPr>
@@ -5507,7 +6827,7 @@
             <a:spLocks noGrp="1"/>
           </p:cNvSpPr>
           <p:nvPr>
-            <p:ph idx="1"/>
+            <p:ph type="ftr" sz="quarter" idx="11"/>
           </p:nvPr>
         </p:nvSpPr>
         <p:spPr/>
@@ -5515,111 +6835,20 @@
           <a:bodyPr/>
           <a:lstStyle/>
           <a:p>
-            <a:endParaRPr lang="en-US" dirty="0"/>
-          </a:p>
-          <a:p>
-            <a:endParaRPr lang="en-US" dirty="0"/>
-          </a:p>
-          <a:p>
-            <a:pPr marL="0" indent="0">
-              <a:buNone/>
-            </a:pPr>
-            <a:r>
-              <a:rPr lang="en-US" dirty="0"/>
-              <a:t>Available on GitHub:</a:t>
-            </a:r>
-          </a:p>
-          <a:p>
-            <a:pPr marL="0" indent="0">
-              <a:buNone/>
-            </a:pPr>
-            <a:endParaRPr lang="en-US" dirty="0"/>
-          </a:p>
-          <a:p>
-            <a:pPr marL="0" indent="0">
-              <a:buNone/>
-            </a:pPr>
-            <a:r>
-              <a:rPr lang="en-US" dirty="0"/>
-              <a:t>Code:</a:t>
-            </a:r>
-          </a:p>
-          <a:p>
-            <a:pPr lvl="1"/>
-            <a:r>
-              <a:rPr lang="en-US" dirty="0">
-                <a:hlinkClick r:id="rId2"/>
-              </a:rPr>
-              <a:t>https://github.com/greenfox-academy/</a:t>
-            </a:r>
-            <a:r>
-              <a:rPr lang="en-US" b="1" dirty="0">
-                <a:hlinkClick r:id="rId2"/>
-              </a:rPr>
-              <a:t>bramble100</a:t>
-            </a:r>
-            <a:r>
-              <a:rPr lang="en-US" dirty="0">
-                <a:hlinkClick r:id="rId2"/>
-              </a:rPr>
-              <a:t>/tree/master/week-04/</a:t>
-            </a:r>
-            <a:r>
-              <a:rPr lang="en-US" b="1" dirty="0">
-                <a:hlinkClick r:id="rId2"/>
-              </a:rPr>
-              <a:t>lightning-talk</a:t>
-            </a:r>
-            <a:endParaRPr lang="en-US" b="1" dirty="0"/>
-          </a:p>
-          <a:p>
-            <a:pPr marL="0" indent="0">
-              <a:buNone/>
-            </a:pPr>
-            <a:r>
-              <a:rPr lang="en-US" dirty="0"/>
-              <a:t>Slides:</a:t>
-            </a:r>
-          </a:p>
-          <a:p>
-            <a:pPr lvl="1"/>
-            <a:r>
-              <a:rPr lang="en-US" dirty="0">
-                <a:hlinkClick r:id="rId2"/>
-              </a:rPr>
-              <a:t>https://github.com/greenfox-academy/</a:t>
-            </a:r>
-            <a:r>
-              <a:rPr lang="en-US" b="1" dirty="0">
-                <a:hlinkClick r:id="rId2"/>
-              </a:rPr>
-              <a:t>bramble100</a:t>
-            </a:r>
-            <a:r>
-              <a:rPr lang="en-US" dirty="0">
-                <a:hlinkClick r:id="rId2"/>
-              </a:rPr>
-              <a:t>/tree/master/week-04/</a:t>
-            </a:r>
-            <a:r>
-              <a:rPr lang="en-US" b="1" dirty="0">
-                <a:hlinkClick r:id="rId2"/>
-              </a:rPr>
-              <a:t>lightning-talk</a:t>
-            </a:r>
-            <a:endParaRPr lang="en-US" b="1" dirty="0"/>
-          </a:p>
-          <a:p>
-            <a:endParaRPr lang="en-US" dirty="0"/>
-          </a:p>
-        </p:txBody>
-      </p:sp>
-      <p:sp>
-        <p:nvSpPr>
-          <p:cNvPr id="4" name="Élőláb helye 3">
+            <a:r>
+              <a:rPr lang="nb-NO"/>
+              <a:t>Lightning talk - Arnold BARNA - 2017-10-18</a:t>
+            </a:r>
+            <a:endParaRPr lang="en-GB"/>
+          </a:p>
+        </p:txBody>
+      </p:sp>
+      <p:sp>
+        <p:nvSpPr>
+          <p:cNvPr id="5" name="Tartalom helye 4">
             <a:extLst>
               <a:ext uri="{FF2B5EF4-FFF2-40B4-BE49-F238E27FC236}">
-                <a16:creationId xmlns:a16="http://schemas.microsoft.com/office/drawing/2014/main" id="{66958B78-773B-41D6-AF3F-17D823913A86}"/>
+                <a16:creationId xmlns:a16="http://schemas.microsoft.com/office/drawing/2014/main" id="{24E2D956-65F1-47CB-B69C-A6F002A1B1FB}"/>
               </a:ext>
             </a:extLst>
           </p:cNvPr>
@@ -5627,32 +6856,250 @@
             <a:spLocks noGrp="1"/>
           </p:cNvSpPr>
           <p:nvPr>
-            <p:ph type="ftr" sz="quarter" idx="11"/>
-          </p:nvPr>
-        </p:nvSpPr>
-        <p:spPr/>
-        <p:txBody>
-          <a:bodyPr/>
-          <a:lstStyle/>
-          <a:p>
-            <a:r>
-              <a:rPr lang="nb-NO"/>
-              <a:t>Lightning talk - Arnold BARNA - 2017-10-15</a:t>
-            </a:r>
-            <a:endParaRPr lang="en-GB"/>
+            <p:ph idx="1"/>
+          </p:nvPr>
+        </p:nvSpPr>
+        <p:spPr>
+          <a:xfrm>
+            <a:off x="1097280" y="1845734"/>
+            <a:ext cx="10058400" cy="1233132"/>
+          </a:xfrm>
+        </p:spPr>
+        <p:txBody>
+          <a:bodyPr>
+            <a:normAutofit/>
+          </a:bodyPr>
+          <a:lstStyle/>
+          <a:p>
+            <a:r>
+              <a:rPr lang="en-US" sz="3200" dirty="0"/>
+              <a:t>“Work expands so as to fill the time available for its completion.”</a:t>
+            </a:r>
+          </a:p>
+        </p:txBody>
+      </p:sp>
+      <p:sp>
+        <p:nvSpPr>
+          <p:cNvPr id="3" name="Szövegdoboz 2">
+            <a:extLst>
+              <a:ext uri="{FF2B5EF4-FFF2-40B4-BE49-F238E27FC236}">
+                <a16:creationId xmlns:a16="http://schemas.microsoft.com/office/drawing/2014/main" id="{6D3CFFB8-1CD7-4F1F-9E62-89DB49C130C5}"/>
+              </a:ext>
+            </a:extLst>
+          </p:cNvPr>
+          <p:cNvSpPr txBox="1"/>
+          <p:nvPr/>
+        </p:nvSpPr>
+        <p:spPr>
+          <a:xfrm>
+            <a:off x="1097280" y="3078866"/>
+            <a:ext cx="10058400" cy="1077218"/>
+          </a:xfrm>
+          <a:prstGeom prst="rect">
+            <a:avLst/>
+          </a:prstGeom>
+          <a:noFill/>
+        </p:spPr>
+        <p:txBody>
+          <a:bodyPr wrap="square" rtlCol="0">
+            <a:spAutoFit/>
+          </a:bodyPr>
+          <a:lstStyle/>
+          <a:p>
+            <a:r>
+              <a:rPr lang="en-US" sz="3200" dirty="0"/>
+              <a:t>If you wait until the last minute, it only takes a minute to do.</a:t>
+            </a:r>
+            <a:endParaRPr lang="en-GB" sz="3200" i="1" dirty="0"/>
+          </a:p>
+        </p:txBody>
+      </p:sp>
+      <p:sp>
+        <p:nvSpPr>
+          <p:cNvPr id="6" name="Szövegdoboz 5">
+            <a:extLst>
+              <a:ext uri="{FF2B5EF4-FFF2-40B4-BE49-F238E27FC236}">
+                <a16:creationId xmlns:a16="http://schemas.microsoft.com/office/drawing/2014/main" id="{CB311857-985B-40F0-9EBF-23B9D1AD55F6}"/>
+              </a:ext>
+            </a:extLst>
+          </p:cNvPr>
+          <p:cNvSpPr txBox="1"/>
+          <p:nvPr/>
+        </p:nvSpPr>
+        <p:spPr>
+          <a:xfrm>
+            <a:off x="1097280" y="4311998"/>
+            <a:ext cx="10058400" cy="584775"/>
+          </a:xfrm>
+          <a:prstGeom prst="rect">
+            <a:avLst/>
+          </a:prstGeom>
+          <a:noFill/>
+        </p:spPr>
+        <p:txBody>
+          <a:bodyPr wrap="square" rtlCol="0">
+            <a:spAutoFit/>
+          </a:bodyPr>
+          <a:lstStyle/>
+          <a:p>
+            <a:r>
+              <a:rPr lang="en-US" sz="3200" dirty="0"/>
+              <a:t>Data expands to fill the space available for storage.</a:t>
+            </a:r>
+            <a:endParaRPr lang="en-GB" sz="3200" i="1" dirty="0"/>
           </a:p>
         </p:txBody>
       </p:sp>
     </p:spTree>
     <p:extLst>
       <p:ext uri="{BB962C8B-B14F-4D97-AF65-F5344CB8AC3E}">
-        <p14:creationId xmlns:p14="http://schemas.microsoft.com/office/powerpoint/2010/main" val="3995058408"/>
+        <p14:creationId xmlns:p14="http://schemas.microsoft.com/office/powerpoint/2010/main" val="3079376859"/>
       </p:ext>
     </p:extLst>
   </p:cSld>
   <p:clrMapOvr>
     <a:masterClrMapping/>
   </p:clrMapOvr>
+  <p:timing>
+    <p:tnLst>
+      <p:par>
+        <p:cTn id="1" dur="indefinite" restart="never" nodeType="tmRoot">
+          <p:childTnLst>
+            <p:seq concurrent="1" nextAc="seek">
+              <p:cTn id="2" dur="indefinite" nodeType="mainSeq">
+                <p:childTnLst>
+                  <p:par>
+                    <p:cTn id="3" fill="hold">
+                      <p:stCondLst>
+                        <p:cond delay="indefinite"/>
+                      </p:stCondLst>
+                      <p:childTnLst>
+                        <p:par>
+                          <p:cTn id="4" fill="hold">
+                            <p:stCondLst>
+                              <p:cond delay="0"/>
+                            </p:stCondLst>
+                            <p:childTnLst>
+                              <p:par>
+                                <p:cTn id="5" presetID="10" presetClass="entr" presetSubtype="0" fill="hold" grpId="0" nodeType="clickEffect">
+                                  <p:stCondLst>
+                                    <p:cond delay="0"/>
+                                  </p:stCondLst>
+                                  <p:childTnLst>
+                                    <p:set>
+                                      <p:cBhvr>
+                                        <p:cTn id="6" dur="1" fill="hold">
+                                          <p:stCondLst>
+                                            <p:cond delay="0"/>
+                                          </p:stCondLst>
+                                        </p:cTn>
+                                        <p:tgtEl>
+                                          <p:spTgt spid="3"/>
+                                        </p:tgtEl>
+                                        <p:attrNameLst>
+                                          <p:attrName>style.visibility</p:attrName>
+                                        </p:attrNameLst>
+                                      </p:cBhvr>
+                                      <p:to>
+                                        <p:strVal val="visible"/>
+                                      </p:to>
+                                    </p:set>
+                                    <p:animEffect transition="in" filter="fade">
+                                      <p:cBhvr>
+                                        <p:cTn id="7" dur="500"/>
+                                        <p:tgtEl>
+                                          <p:spTgt spid="3"/>
+                                        </p:tgtEl>
+                                      </p:cBhvr>
+                                    </p:animEffect>
+                                  </p:childTnLst>
+                                </p:cTn>
+                              </p:par>
+                            </p:childTnLst>
+                          </p:cTn>
+                        </p:par>
+                      </p:childTnLst>
+                    </p:cTn>
+                  </p:par>
+                  <p:par>
+                    <p:cTn id="8" fill="hold">
+                      <p:stCondLst>
+                        <p:cond delay="indefinite"/>
+                      </p:stCondLst>
+                      <p:childTnLst>
+                        <p:par>
+                          <p:cTn id="9" fill="hold">
+                            <p:stCondLst>
+                              <p:cond delay="0"/>
+                            </p:stCondLst>
+                            <p:childTnLst>
+                              <p:par>
+                                <p:cTn id="10" presetID="10" presetClass="entr" presetSubtype="0" fill="hold" grpId="0" nodeType="clickEffect">
+                                  <p:stCondLst>
+                                    <p:cond delay="0"/>
+                                  </p:stCondLst>
+                                  <p:childTnLst>
+                                    <p:set>
+                                      <p:cBhvr>
+                                        <p:cTn id="11" dur="1" fill="hold">
+                                          <p:stCondLst>
+                                            <p:cond delay="0"/>
+                                          </p:stCondLst>
+                                        </p:cTn>
+                                        <p:tgtEl>
+                                          <p:spTgt spid="6"/>
+                                        </p:tgtEl>
+                                        <p:attrNameLst>
+                                          <p:attrName>style.visibility</p:attrName>
+                                        </p:attrNameLst>
+                                      </p:cBhvr>
+                                      <p:to>
+                                        <p:strVal val="visible"/>
+                                      </p:to>
+                                    </p:set>
+                                    <p:animEffect transition="in" filter="fade">
+                                      <p:cBhvr>
+                                        <p:cTn id="12" dur="500"/>
+                                        <p:tgtEl>
+                                          <p:spTgt spid="6"/>
+                                        </p:tgtEl>
+                                      </p:cBhvr>
+                                    </p:animEffect>
+                                  </p:childTnLst>
+                                </p:cTn>
+                              </p:par>
+                            </p:childTnLst>
+                          </p:cTn>
+                        </p:par>
+                      </p:childTnLst>
+                    </p:cTn>
+                  </p:par>
+                </p:childTnLst>
+              </p:cTn>
+              <p:prevCondLst>
+                <p:cond evt="onPrev" delay="0">
+                  <p:tgtEl>
+                    <p:sldTgt/>
+                  </p:tgtEl>
+                </p:cond>
+              </p:prevCondLst>
+              <p:nextCondLst>
+                <p:cond evt="onNext" delay="0">
+                  <p:tgtEl>
+                    <p:sldTgt/>
+                  </p:tgtEl>
+                </p:cond>
+              </p:nextCondLst>
+            </p:seq>
+          </p:childTnLst>
+        </p:cTn>
+      </p:par>
+    </p:tnLst>
+    <p:bldLst>
+      <p:bldP spid="3" grpId="0"/>
+      <p:bldP spid="6" grpId="0"/>
+    </p:bldLst>
+  </p:timing>
 </p:sld>
 </file>
 

</xml_diff>